<commit_message>
Finalized tileset builder for 3x3 minimal tileset
</commit_message>
<xml_diff>
--- a/Doc/ConversionInfo.pptx
+++ b/Doc/ConversionInfo.pptx
@@ -9215,7 +9215,7 @@
         <p:spPr>
           <a:xfrm>
             <a:off x="5181600" y="1828800"/>
-            <a:ext cx="389850" cy="215444"/>
+            <a:ext cx="378630" cy="215444"/>
           </a:xfrm>
           <a:prstGeom prst="rect">
             <a:avLst/>
@@ -9230,7 +9230,11 @@
           <a:p>
             <a:r>
               <a:rPr lang="en-US" sz="800" dirty="0" smtClean="0"/>
-              <a:t>1,3 d</a:t>
+              <a:t>1,3 </a:t>
+            </a:r>
+            <a:r>
+              <a:rPr lang="en-US" sz="800" dirty="0" smtClean="0"/>
+              <a:t>c</a:t>
             </a:r>
             <a:endParaRPr lang="en-US" sz="800" dirty="0"/>
           </a:p>
@@ -9305,7 +9309,7 @@
         <p:spPr>
           <a:xfrm>
             <a:off x="5181600" y="3200400"/>
-            <a:ext cx="389850" cy="215444"/>
+            <a:ext cx="378630" cy="215444"/>
           </a:xfrm>
           <a:prstGeom prst="rect">
             <a:avLst/>
@@ -9319,8 +9323,12 @@
           <a:lstStyle/>
           <a:p>
             <a:r>
-              <a:rPr lang="en-US" sz="800" dirty="0" smtClean="0"/>
-              <a:t>1,3 d</a:t>
+              <a:rPr lang="en-US" sz="800" smtClean="0"/>
+              <a:t>1,3 </a:t>
+            </a:r>
+            <a:r>
+              <a:rPr lang="en-US" sz="800" smtClean="0"/>
+              <a:t>c</a:t>
             </a:r>
             <a:endParaRPr lang="en-US" sz="800" dirty="0"/>
           </a:p>
@@ -11283,7 +11291,7 @@
         <p:spPr>
           <a:xfrm>
             <a:off x="7391400" y="4343400"/>
-            <a:ext cx="386644" cy="215444"/>
+            <a:ext cx="385042" cy="215444"/>
           </a:xfrm>
           <a:prstGeom prst="rect">
             <a:avLst/>
@@ -11298,7 +11306,7 @@
           <a:p>
             <a:r>
               <a:rPr lang="en-US" sz="800" dirty="0" smtClean="0"/>
-              <a:t>0,0 1</a:t>
+              <a:t>0,0 a</a:t>
             </a:r>
             <a:endParaRPr lang="en-US" sz="800" dirty="0"/>
           </a:p>

</xml_diff>

<commit_message>
Fix sub tile template definition
</commit_message>
<xml_diff>
--- a/Doc/ConversionInfo.pptx
+++ b/Doc/ConversionInfo.pptx
@@ -106,7 +106,7 @@
   </p:defaultTextStyle>
   <p:extLst>
     <p:ext uri="{EFAFB233-063F-42B5-8137-9DF3F51BA10A}">
-      <p15:sldGuideLst xmlns:p15="http://schemas.microsoft.com/office/powerpoint/2012/main">
+      <p15:sldGuideLst xmlns="" xmlns:p15="http://schemas.microsoft.com/office/powerpoint/2012/main">
         <p15:guide id="1" orient="horz" pos="2160">
           <p15:clr>
             <a:srgbClr val="A4A3A4"/>
@@ -305,7 +305,7 @@
             <a:fld id="{09596975-BC73-4E43-BF4D-C73F5CF033D0}" type="datetimeFigureOut">
               <a:rPr lang="en-US" smtClean="0"/>
               <a:pPr/>
-              <a:t>18.3.2019</a:t>
+              <a:t>3/18/2019</a:t>
             </a:fld>
             <a:endParaRPr lang="en-US"/>
           </a:p>
@@ -472,7 +472,7 @@
             <a:fld id="{09596975-BC73-4E43-BF4D-C73F5CF033D0}" type="datetimeFigureOut">
               <a:rPr lang="en-US" smtClean="0"/>
               <a:pPr/>
-              <a:t>18.3.2019</a:t>
+              <a:t>3/18/2019</a:t>
             </a:fld>
             <a:endParaRPr lang="en-US"/>
           </a:p>
@@ -649,7 +649,7 @@
             <a:fld id="{09596975-BC73-4E43-BF4D-C73F5CF033D0}" type="datetimeFigureOut">
               <a:rPr lang="en-US" smtClean="0"/>
               <a:pPr/>
-              <a:t>18.3.2019</a:t>
+              <a:t>3/18/2019</a:t>
             </a:fld>
             <a:endParaRPr lang="en-US"/>
           </a:p>
@@ -816,7 +816,7 @@
             <a:fld id="{09596975-BC73-4E43-BF4D-C73F5CF033D0}" type="datetimeFigureOut">
               <a:rPr lang="en-US" smtClean="0"/>
               <a:pPr/>
-              <a:t>18.3.2019</a:t>
+              <a:t>3/18/2019</a:t>
             </a:fld>
             <a:endParaRPr lang="en-US"/>
           </a:p>
@@ -1059,7 +1059,7 @@
             <a:fld id="{09596975-BC73-4E43-BF4D-C73F5CF033D0}" type="datetimeFigureOut">
               <a:rPr lang="en-US" smtClean="0"/>
               <a:pPr/>
-              <a:t>18.3.2019</a:t>
+              <a:t>3/18/2019</a:t>
             </a:fld>
             <a:endParaRPr lang="en-US"/>
           </a:p>
@@ -1344,7 +1344,7 @@
             <a:fld id="{09596975-BC73-4E43-BF4D-C73F5CF033D0}" type="datetimeFigureOut">
               <a:rPr lang="en-US" smtClean="0"/>
               <a:pPr/>
-              <a:t>18.3.2019</a:t>
+              <a:t>3/18/2019</a:t>
             </a:fld>
             <a:endParaRPr lang="en-US"/>
           </a:p>
@@ -1763,7 +1763,7 @@
             <a:fld id="{09596975-BC73-4E43-BF4D-C73F5CF033D0}" type="datetimeFigureOut">
               <a:rPr lang="en-US" smtClean="0"/>
               <a:pPr/>
-              <a:t>18.3.2019</a:t>
+              <a:t>3/18/2019</a:t>
             </a:fld>
             <a:endParaRPr lang="en-US"/>
           </a:p>
@@ -1878,7 +1878,7 @@
             <a:fld id="{09596975-BC73-4E43-BF4D-C73F5CF033D0}" type="datetimeFigureOut">
               <a:rPr lang="en-US" smtClean="0"/>
               <a:pPr/>
-              <a:t>18.3.2019</a:t>
+              <a:t>3/18/2019</a:t>
             </a:fld>
             <a:endParaRPr lang="en-US"/>
           </a:p>
@@ -1970,7 +1970,7 @@
             <a:fld id="{09596975-BC73-4E43-BF4D-C73F5CF033D0}" type="datetimeFigureOut">
               <a:rPr lang="en-US" smtClean="0"/>
               <a:pPr/>
-              <a:t>18.3.2019</a:t>
+              <a:t>3/18/2019</a:t>
             </a:fld>
             <a:endParaRPr lang="en-US"/>
           </a:p>
@@ -2244,7 +2244,7 @@
             <a:fld id="{09596975-BC73-4E43-BF4D-C73F5CF033D0}" type="datetimeFigureOut">
               <a:rPr lang="en-US" smtClean="0"/>
               <a:pPr/>
-              <a:t>18.3.2019</a:t>
+              <a:t>3/18/2019</a:t>
             </a:fld>
             <a:endParaRPr lang="en-US"/>
           </a:p>
@@ -2494,7 +2494,7 @@
             <a:fld id="{09596975-BC73-4E43-BF4D-C73F5CF033D0}" type="datetimeFigureOut">
               <a:rPr lang="en-US" smtClean="0"/>
               <a:pPr/>
-              <a:t>18.3.2019</a:t>
+              <a:t>3/18/2019</a:t>
             </a:fld>
             <a:endParaRPr lang="en-US"/>
           </a:p>
@@ -2704,7 +2704,7 @@
             <a:fld id="{09596975-BC73-4E43-BF4D-C73F5CF033D0}" type="datetimeFigureOut">
               <a:rPr lang="en-US" smtClean="0"/>
               <a:pPr/>
-              <a:t>18.3.2019</a:t>
+              <a:t>3/18/2019</a:t>
             </a:fld>
             <a:endParaRPr lang="en-US"/>
           </a:p>
@@ -8862,8 +8862,8 @@
         </p:nvSpPr>
         <p:spPr>
           <a:xfrm>
-            <a:off x="6781800" y="762000"/>
-            <a:ext cx="439544" cy="215444"/>
+            <a:off x="6629400" y="685800"/>
+            <a:ext cx="385042" cy="215444"/>
           </a:xfrm>
           <a:prstGeom prst="rect">
             <a:avLst/>
@@ -8881,8 +8881,8 @@
               <a:t>1,4 </a:t>
             </a:r>
             <a:r>
-              <a:rPr lang="en-US" sz="800" dirty="0" err="1" smtClean="0"/>
-              <a:t>ab</a:t>
+              <a:rPr lang="en-US" sz="800" dirty="0" smtClean="0"/>
+              <a:t>a</a:t>
             </a:r>
             <a:endParaRPr lang="en-US" sz="800" dirty="0"/>
           </a:p>
@@ -8896,8 +8896,8 @@
         </p:nvSpPr>
         <p:spPr>
           <a:xfrm>
-            <a:off x="6781800" y="1066800"/>
-            <a:ext cx="433132" cy="215444"/>
+            <a:off x="7010400" y="1066800"/>
+            <a:ext cx="389850" cy="215444"/>
           </a:xfrm>
           <a:prstGeom prst="rect">
             <a:avLst/>
@@ -8915,8 +8915,8 @@
               <a:t>0,3 </a:t>
             </a:r>
             <a:r>
-              <a:rPr lang="en-US" sz="800" dirty="0" err="1" smtClean="0"/>
-              <a:t>cd</a:t>
+              <a:rPr lang="en-US" sz="800" dirty="0" smtClean="0"/>
+              <a:t>d</a:t>
             </a:r>
             <a:endParaRPr lang="en-US" sz="800" dirty="0"/>
           </a:p>
@@ -8998,8 +8998,8 @@
         </p:nvSpPr>
         <p:spPr>
           <a:xfrm>
-            <a:off x="8108950" y="838200"/>
-            <a:ext cx="381000" cy="338554"/>
+            <a:off x="8077200" y="685800"/>
+            <a:ext cx="381000" cy="215444"/>
           </a:xfrm>
           <a:prstGeom prst="rect">
             <a:avLst/>
@@ -9014,13 +9014,7 @@
           <a:p>
             <a:r>
               <a:rPr lang="en-US" sz="800" dirty="0" smtClean="0"/>
-              <a:t>1,4 </a:t>
-            </a:r>
-          </a:p>
-          <a:p>
-            <a:r>
-              <a:rPr lang="en-US" sz="800" dirty="0" smtClean="0"/>
-              <a:t>ac</a:t>
+              <a:t>14a</a:t>
             </a:r>
             <a:endParaRPr lang="en-US" sz="800" dirty="0"/>
           </a:p>
@@ -9230,11 +9224,7 @@
           <a:p>
             <a:r>
               <a:rPr lang="en-US" sz="800" dirty="0" smtClean="0"/>
-              <a:t>1,3 </a:t>
-            </a:r>
-            <a:r>
-              <a:rPr lang="en-US" sz="800" dirty="0" smtClean="0"/>
-              <a:t>c</a:t>
+              <a:t>1,3 c</a:t>
             </a:r>
             <a:endParaRPr lang="en-US" sz="800" dirty="0"/>
           </a:p>
@@ -9324,11 +9314,7 @@
           <a:p>
             <a:r>
               <a:rPr lang="en-US" sz="800" smtClean="0"/>
-              <a:t>1,3 </a:t>
-            </a:r>
-            <a:r>
-              <a:rPr lang="en-US" sz="800" smtClean="0"/>
-              <a:t>c</a:t>
+              <a:t>1,3 c</a:t>
             </a:r>
             <a:endParaRPr lang="en-US" sz="800" dirty="0"/>
           </a:p>
@@ -9421,8 +9407,8 @@
           <a:lstStyle/>
           <a:p>
             <a:r>
-              <a:rPr lang="en-US" sz="800" dirty="0" smtClean="0"/>
-              <a:t>0,4 </a:t>
+              <a:rPr lang="en-US" sz="800" smtClean="0"/>
+              <a:t>2,2 </a:t>
             </a:r>
             <a:r>
               <a:rPr lang="en-US" sz="800" dirty="0" err="1" smtClean="0"/>
@@ -9692,8 +9678,8 @@
         </p:nvSpPr>
         <p:spPr>
           <a:xfrm>
-            <a:off x="6781800" y="2895600"/>
-            <a:ext cx="439544" cy="215444"/>
+            <a:off x="6629400" y="2895600"/>
+            <a:ext cx="336952" cy="215444"/>
           </a:xfrm>
           <a:prstGeom prst="rect">
             <a:avLst/>
@@ -9708,11 +9694,7 @@
           <a:p>
             <a:r>
               <a:rPr lang="en-US" sz="800" dirty="0" smtClean="0"/>
-              <a:t>1,4 </a:t>
-            </a:r>
-            <a:r>
-              <a:rPr lang="en-US" sz="800" dirty="0" err="1" smtClean="0"/>
-              <a:t>ab</a:t>
+              <a:t>14a</a:t>
             </a:r>
             <a:endParaRPr lang="en-US" sz="800" dirty="0"/>
           </a:p>
@@ -9726,8 +9708,8 @@
         </p:nvSpPr>
         <p:spPr>
           <a:xfrm>
-            <a:off x="7467600" y="2895600"/>
-            <a:ext cx="439544" cy="215444"/>
+            <a:off x="7696200" y="2895600"/>
+            <a:ext cx="341760" cy="215444"/>
           </a:xfrm>
           <a:prstGeom prst="rect">
             <a:avLst/>
@@ -9742,11 +9724,7 @@
           <a:p>
             <a:r>
               <a:rPr lang="en-US" sz="800" dirty="0" smtClean="0"/>
-              <a:t>0,4 </a:t>
-            </a:r>
-            <a:r>
-              <a:rPr lang="en-US" sz="800" dirty="0" err="1" smtClean="0"/>
-              <a:t>ab</a:t>
+              <a:t>04b</a:t>
             </a:r>
             <a:endParaRPr lang="en-US" sz="800" dirty="0"/>
           </a:p>
@@ -9934,8 +9912,8 @@
         </p:nvSpPr>
         <p:spPr>
           <a:xfrm>
-            <a:off x="5562600" y="1600200"/>
-            <a:ext cx="381000" cy="338554"/>
+            <a:off x="5562600" y="1447800"/>
+            <a:ext cx="381000" cy="215444"/>
           </a:xfrm>
           <a:prstGeom prst="rect">
             <a:avLst/>
@@ -9950,13 +9928,7 @@
           <a:p>
             <a:r>
               <a:rPr lang="en-US" sz="800" dirty="0" smtClean="0"/>
-              <a:t>0,4 </a:t>
-            </a:r>
-          </a:p>
-          <a:p>
-            <a:r>
-              <a:rPr lang="en-US" sz="800" dirty="0" err="1" smtClean="0"/>
-              <a:t>bd</a:t>
+              <a:t>0,4b</a:t>
             </a:r>
             <a:endParaRPr lang="en-US" sz="800" dirty="0"/>
           </a:p>
@@ -9970,8 +9942,8 @@
         </p:nvSpPr>
         <p:spPr>
           <a:xfrm>
-            <a:off x="4800600" y="1600200"/>
-            <a:ext cx="381000" cy="338554"/>
+            <a:off x="4800600" y="1447800"/>
+            <a:ext cx="381000" cy="215444"/>
           </a:xfrm>
           <a:prstGeom prst="rect">
             <a:avLst/>
@@ -9986,13 +9958,7 @@
           <a:p>
             <a:r>
               <a:rPr lang="en-US" sz="800" dirty="0" smtClean="0"/>
-              <a:t>0,4 </a:t>
-            </a:r>
-          </a:p>
-          <a:p>
-            <a:r>
-              <a:rPr lang="en-US" sz="800" dirty="0" err="1" smtClean="0"/>
-              <a:t>bd</a:t>
+              <a:t>04b</a:t>
             </a:r>
             <a:endParaRPr lang="en-US" sz="800" dirty="0"/>
           </a:p>
@@ -10006,8 +9972,8 @@
         </p:nvSpPr>
         <p:spPr>
           <a:xfrm>
-            <a:off x="4495800" y="1600200"/>
-            <a:ext cx="381000" cy="338554"/>
+            <a:off x="4495800" y="1752600"/>
+            <a:ext cx="381000" cy="215444"/>
           </a:xfrm>
           <a:prstGeom prst="rect">
             <a:avLst/>
@@ -10022,13 +9988,7 @@
           <a:p>
             <a:r>
               <a:rPr lang="en-US" sz="800" dirty="0" smtClean="0"/>
-              <a:t>1,3 </a:t>
-            </a:r>
-          </a:p>
-          <a:p>
-            <a:r>
-              <a:rPr lang="en-US" sz="800" dirty="0" smtClean="0"/>
-              <a:t>ac</a:t>
+              <a:t>13c</a:t>
             </a:r>
             <a:endParaRPr lang="en-US" sz="800" dirty="0"/>
           </a:p>
@@ -10042,8 +10002,8 @@
         </p:nvSpPr>
         <p:spPr>
           <a:xfrm>
-            <a:off x="7010400" y="1524000"/>
-            <a:ext cx="381000" cy="338554"/>
+            <a:off x="6934200" y="1447800"/>
+            <a:ext cx="381000" cy="215444"/>
           </a:xfrm>
           <a:prstGeom prst="rect">
             <a:avLst/>
@@ -10058,13 +10018,7 @@
           <a:p>
             <a:r>
               <a:rPr lang="en-US" sz="800" dirty="0" smtClean="0"/>
-              <a:t>0,3 </a:t>
-            </a:r>
-          </a:p>
-          <a:p>
-            <a:r>
-              <a:rPr lang="en-US" sz="800" dirty="0" err="1" smtClean="0"/>
-              <a:t>bd</a:t>
+              <a:t>02b</a:t>
             </a:r>
             <a:endParaRPr lang="en-US" sz="800" dirty="0"/>
           </a:p>
@@ -10080,6 +10034,1628 @@
           <a:xfrm>
             <a:off x="7391400" y="1752600"/>
             <a:ext cx="685800" cy="1588"/>
+          </a:xfrm>
+          <a:prstGeom prst="line">
+            <a:avLst/>
+          </a:prstGeom>
+        </p:spPr>
+        <p:style>
+          <a:lnRef idx="1">
+            <a:schemeClr val="accent1"/>
+          </a:lnRef>
+          <a:fillRef idx="0">
+            <a:schemeClr val="accent1"/>
+          </a:fillRef>
+          <a:effectRef idx="0">
+            <a:schemeClr val="accent1"/>
+          </a:effectRef>
+          <a:fontRef idx="minor">
+            <a:schemeClr val="tx1"/>
+          </a:fontRef>
+        </p:style>
+      </p:cxnSp>
+      <p:sp>
+        <p:nvSpPr>
+          <p:cNvPr id="276" name="TextBox 275"/>
+          <p:cNvSpPr txBox="1"/>
+          <p:nvPr/>
+        </p:nvSpPr>
+        <p:spPr>
+          <a:xfrm>
+            <a:off x="7772400" y="1447800"/>
+            <a:ext cx="341760" cy="215444"/>
+          </a:xfrm>
+          <a:prstGeom prst="rect">
+            <a:avLst/>
+          </a:prstGeom>
+          <a:noFill/>
+        </p:spPr>
+        <p:txBody>
+          <a:bodyPr wrap="none" rtlCol="0">
+            <a:spAutoFit/>
+          </a:bodyPr>
+          <a:lstStyle/>
+          <a:p>
+            <a:r>
+              <a:rPr lang="en-US" sz="800" dirty="0" smtClean="0"/>
+              <a:t>04b</a:t>
+            </a:r>
+            <a:endParaRPr lang="en-US" sz="800" dirty="0"/>
+          </a:p>
+        </p:txBody>
+      </p:sp>
+      <p:sp>
+        <p:nvSpPr>
+          <p:cNvPr id="277" name="TextBox 276"/>
+          <p:cNvSpPr txBox="1"/>
+          <p:nvPr/>
+        </p:nvSpPr>
+        <p:spPr>
+          <a:xfrm>
+            <a:off x="7740650" y="1828800"/>
+            <a:ext cx="389850" cy="215444"/>
+          </a:xfrm>
+          <a:prstGeom prst="rect">
+            <a:avLst/>
+          </a:prstGeom>
+          <a:noFill/>
+        </p:spPr>
+        <p:txBody>
+          <a:bodyPr wrap="none" rtlCol="0">
+            <a:spAutoFit/>
+          </a:bodyPr>
+          <a:lstStyle/>
+          <a:p>
+            <a:r>
+              <a:rPr lang="en-US" sz="800" dirty="0" smtClean="0"/>
+              <a:t>0,3 d</a:t>
+            </a:r>
+            <a:endParaRPr lang="en-US" sz="800" dirty="0"/>
+          </a:p>
+        </p:txBody>
+      </p:sp>
+      <p:sp>
+        <p:nvSpPr>
+          <p:cNvPr id="278" name="TextBox 277"/>
+          <p:cNvSpPr txBox="1"/>
+          <p:nvPr/>
+        </p:nvSpPr>
+        <p:spPr>
+          <a:xfrm>
+            <a:off x="7359650" y="1828800"/>
+            <a:ext cx="378630" cy="215444"/>
+          </a:xfrm>
+          <a:prstGeom prst="rect">
+            <a:avLst/>
+          </a:prstGeom>
+          <a:noFill/>
+        </p:spPr>
+        <p:txBody>
+          <a:bodyPr wrap="none" rtlCol="0">
+            <a:spAutoFit/>
+          </a:bodyPr>
+          <a:lstStyle/>
+          <a:p>
+            <a:r>
+              <a:rPr lang="en-US" sz="800" dirty="0" smtClean="0"/>
+              <a:t>1,3 c</a:t>
+            </a:r>
+            <a:endParaRPr lang="en-US" sz="800" dirty="0"/>
+          </a:p>
+        </p:txBody>
+      </p:sp>
+      <p:cxnSp>
+        <p:nvCxnSpPr>
+          <p:cNvPr id="279" name="Straight Connector 278"/>
+          <p:cNvCxnSpPr/>
+          <p:nvPr/>
+        </p:nvCxnSpPr>
+        <p:spPr>
+          <a:xfrm>
+            <a:off x="6629400" y="1752600"/>
+            <a:ext cx="304800" cy="1588"/>
+          </a:xfrm>
+          <a:prstGeom prst="line">
+            <a:avLst/>
+          </a:prstGeom>
+        </p:spPr>
+        <p:style>
+          <a:lnRef idx="1">
+            <a:schemeClr val="accent1"/>
+          </a:lnRef>
+          <a:fillRef idx="0">
+            <a:schemeClr val="accent1"/>
+          </a:fillRef>
+          <a:effectRef idx="0">
+            <a:schemeClr val="accent1"/>
+          </a:effectRef>
+          <a:fontRef idx="minor">
+            <a:schemeClr val="tx1"/>
+          </a:fontRef>
+        </p:style>
+      </p:cxnSp>
+      <p:sp>
+        <p:nvSpPr>
+          <p:cNvPr id="280" name="TextBox 279"/>
+          <p:cNvSpPr txBox="1"/>
+          <p:nvPr/>
+        </p:nvSpPr>
+        <p:spPr>
+          <a:xfrm>
+            <a:off x="6629400" y="1447800"/>
+            <a:ext cx="385042" cy="215444"/>
+          </a:xfrm>
+          <a:prstGeom prst="rect">
+            <a:avLst/>
+          </a:prstGeom>
+          <a:noFill/>
+        </p:spPr>
+        <p:txBody>
+          <a:bodyPr wrap="none" rtlCol="0">
+            <a:spAutoFit/>
+          </a:bodyPr>
+          <a:lstStyle/>
+          <a:p>
+            <a:r>
+              <a:rPr lang="en-US" sz="800" dirty="0" smtClean="0"/>
+              <a:t>1,4 a</a:t>
+            </a:r>
+            <a:endParaRPr lang="en-US" sz="800" dirty="0"/>
+          </a:p>
+        </p:txBody>
+      </p:sp>
+      <p:sp>
+        <p:nvSpPr>
+          <p:cNvPr id="281" name="TextBox 280"/>
+          <p:cNvSpPr txBox="1"/>
+          <p:nvPr/>
+        </p:nvSpPr>
+        <p:spPr>
+          <a:xfrm>
+            <a:off x="6629400" y="1828800"/>
+            <a:ext cx="378630" cy="215444"/>
+          </a:xfrm>
+          <a:prstGeom prst="rect">
+            <a:avLst/>
+          </a:prstGeom>
+          <a:noFill/>
+        </p:spPr>
+        <p:txBody>
+          <a:bodyPr wrap="none" rtlCol="0">
+            <a:spAutoFit/>
+          </a:bodyPr>
+          <a:lstStyle/>
+          <a:p>
+            <a:r>
+              <a:rPr lang="en-US" sz="800" dirty="0" smtClean="0"/>
+              <a:t>1,3 c</a:t>
+            </a:r>
+            <a:endParaRPr lang="en-US" sz="800" dirty="0"/>
+          </a:p>
+        </p:txBody>
+      </p:sp>
+      <p:sp>
+        <p:nvSpPr>
+          <p:cNvPr id="282" name="TextBox 281"/>
+          <p:cNvSpPr txBox="1"/>
+          <p:nvPr/>
+        </p:nvSpPr>
+        <p:spPr>
+          <a:xfrm>
+            <a:off x="4114800" y="2209800"/>
+            <a:ext cx="381000" cy="215444"/>
+          </a:xfrm>
+          <a:prstGeom prst="rect">
+            <a:avLst/>
+          </a:prstGeom>
+          <a:noFill/>
+        </p:spPr>
+        <p:txBody>
+          <a:bodyPr wrap="square" rtlCol="0">
+            <a:spAutoFit/>
+          </a:bodyPr>
+          <a:lstStyle/>
+          <a:p>
+            <a:r>
+              <a:rPr lang="en-US" sz="800" dirty="0" smtClean="0"/>
+              <a:t>0,4b</a:t>
+            </a:r>
+            <a:endParaRPr lang="en-US" sz="800" dirty="0"/>
+          </a:p>
+        </p:txBody>
+      </p:sp>
+      <p:sp>
+        <p:nvSpPr>
+          <p:cNvPr id="283" name="TextBox 282"/>
+          <p:cNvSpPr txBox="1"/>
+          <p:nvPr/>
+        </p:nvSpPr>
+        <p:spPr>
+          <a:xfrm>
+            <a:off x="3790950" y="2286000"/>
+            <a:ext cx="381000" cy="338554"/>
+          </a:xfrm>
+          <a:prstGeom prst="rect">
+            <a:avLst/>
+          </a:prstGeom>
+          <a:noFill/>
+        </p:spPr>
+        <p:txBody>
+          <a:bodyPr wrap="square" rtlCol="0">
+            <a:spAutoFit/>
+          </a:bodyPr>
+          <a:lstStyle/>
+          <a:p>
+            <a:r>
+              <a:rPr lang="en-US" sz="800" dirty="0" smtClean="0"/>
+              <a:t>0,1 </a:t>
+            </a:r>
+          </a:p>
+          <a:p>
+            <a:r>
+              <a:rPr lang="en-US" sz="800" dirty="0" smtClean="0"/>
+              <a:t>ac</a:t>
+            </a:r>
+            <a:endParaRPr lang="en-US" sz="800" dirty="0"/>
+          </a:p>
+        </p:txBody>
+      </p:sp>
+      <p:sp>
+        <p:nvSpPr>
+          <p:cNvPr id="284" name="TextBox 283"/>
+          <p:cNvSpPr txBox="1"/>
+          <p:nvPr/>
+        </p:nvSpPr>
+        <p:spPr>
+          <a:xfrm>
+            <a:off x="4495800" y="2286000"/>
+            <a:ext cx="381000" cy="338554"/>
+          </a:xfrm>
+          <a:prstGeom prst="rect">
+            <a:avLst/>
+          </a:prstGeom>
+          <a:noFill/>
+        </p:spPr>
+        <p:txBody>
+          <a:bodyPr wrap="square" rtlCol="0">
+            <a:spAutoFit/>
+          </a:bodyPr>
+          <a:lstStyle/>
+          <a:p>
+            <a:r>
+              <a:rPr lang="en-US" sz="800" dirty="0" smtClean="0"/>
+              <a:t>0,1 </a:t>
+            </a:r>
+          </a:p>
+          <a:p>
+            <a:r>
+              <a:rPr lang="en-US" sz="800" dirty="0" smtClean="0"/>
+              <a:t>ac</a:t>
+            </a:r>
+            <a:endParaRPr lang="en-US" sz="800" dirty="0"/>
+          </a:p>
+        </p:txBody>
+      </p:sp>
+      <p:sp>
+        <p:nvSpPr>
+          <p:cNvPr id="285" name="TextBox 284"/>
+          <p:cNvSpPr txBox="1"/>
+          <p:nvPr/>
+        </p:nvSpPr>
+        <p:spPr>
+          <a:xfrm>
+            <a:off x="5181600" y="2286000"/>
+            <a:ext cx="381000" cy="338554"/>
+          </a:xfrm>
+          <a:prstGeom prst="rect">
+            <a:avLst/>
+          </a:prstGeom>
+          <a:noFill/>
+        </p:spPr>
+        <p:txBody>
+          <a:bodyPr wrap="square" rtlCol="0">
+            <a:spAutoFit/>
+          </a:bodyPr>
+          <a:lstStyle/>
+          <a:p>
+            <a:r>
+              <a:rPr lang="en-US" sz="800" dirty="0" smtClean="0"/>
+              <a:t>0,1 </a:t>
+            </a:r>
+          </a:p>
+          <a:p>
+            <a:r>
+              <a:rPr lang="en-US" sz="800" dirty="0" smtClean="0"/>
+              <a:t>ac</a:t>
+            </a:r>
+            <a:endParaRPr lang="en-US" sz="800" dirty="0"/>
+          </a:p>
+        </p:txBody>
+      </p:sp>
+      <p:sp>
+        <p:nvSpPr>
+          <p:cNvPr id="286" name="TextBox 285"/>
+          <p:cNvSpPr txBox="1"/>
+          <p:nvPr/>
+        </p:nvSpPr>
+        <p:spPr>
+          <a:xfrm>
+            <a:off x="4102100" y="3048000"/>
+            <a:ext cx="381000" cy="338554"/>
+          </a:xfrm>
+          <a:prstGeom prst="rect">
+            <a:avLst/>
+          </a:prstGeom>
+          <a:noFill/>
+        </p:spPr>
+        <p:txBody>
+          <a:bodyPr wrap="square" rtlCol="0">
+            <a:spAutoFit/>
+          </a:bodyPr>
+          <a:lstStyle/>
+          <a:p>
+            <a:r>
+              <a:rPr lang="en-US" sz="800" dirty="0" smtClean="0"/>
+              <a:t>2,1 </a:t>
+            </a:r>
+          </a:p>
+          <a:p>
+            <a:r>
+              <a:rPr lang="en-US" sz="800" dirty="0" err="1" smtClean="0"/>
+              <a:t>bd</a:t>
+            </a:r>
+            <a:endParaRPr lang="en-US" sz="800" dirty="0"/>
+          </a:p>
+        </p:txBody>
+      </p:sp>
+      <p:sp>
+        <p:nvSpPr>
+          <p:cNvPr id="287" name="TextBox 286"/>
+          <p:cNvSpPr txBox="1"/>
+          <p:nvPr/>
+        </p:nvSpPr>
+        <p:spPr>
+          <a:xfrm>
+            <a:off x="4800600" y="3048000"/>
+            <a:ext cx="381000" cy="338554"/>
+          </a:xfrm>
+          <a:prstGeom prst="rect">
+            <a:avLst/>
+          </a:prstGeom>
+          <a:noFill/>
+        </p:spPr>
+        <p:txBody>
+          <a:bodyPr wrap="square" rtlCol="0">
+            <a:spAutoFit/>
+          </a:bodyPr>
+          <a:lstStyle/>
+          <a:p>
+            <a:r>
+              <a:rPr lang="en-US" sz="800" dirty="0" smtClean="0"/>
+              <a:t>2,1 </a:t>
+            </a:r>
+          </a:p>
+          <a:p>
+            <a:r>
+              <a:rPr lang="en-US" sz="800" dirty="0" err="1" smtClean="0"/>
+              <a:t>bd</a:t>
+            </a:r>
+            <a:endParaRPr lang="en-US" sz="800" dirty="0"/>
+          </a:p>
+        </p:txBody>
+      </p:sp>
+      <p:sp>
+        <p:nvSpPr>
+          <p:cNvPr id="288" name="TextBox 287"/>
+          <p:cNvSpPr txBox="1"/>
+          <p:nvPr/>
+        </p:nvSpPr>
+        <p:spPr>
+          <a:xfrm>
+            <a:off x="5562600" y="3048000"/>
+            <a:ext cx="381000" cy="338554"/>
+          </a:xfrm>
+          <a:prstGeom prst="rect">
+            <a:avLst/>
+          </a:prstGeom>
+          <a:noFill/>
+        </p:spPr>
+        <p:txBody>
+          <a:bodyPr wrap="square" rtlCol="0">
+            <a:spAutoFit/>
+          </a:bodyPr>
+          <a:lstStyle/>
+          <a:p>
+            <a:r>
+              <a:rPr lang="en-US" sz="800" dirty="0" smtClean="0"/>
+              <a:t>2,1 </a:t>
+            </a:r>
+          </a:p>
+          <a:p>
+            <a:r>
+              <a:rPr lang="en-US" sz="800" dirty="0" err="1" smtClean="0"/>
+              <a:t>bd</a:t>
+            </a:r>
+            <a:endParaRPr lang="en-US" sz="800" dirty="0"/>
+          </a:p>
+        </p:txBody>
+      </p:sp>
+      <p:sp>
+        <p:nvSpPr>
+          <p:cNvPr id="289" name="TextBox 288"/>
+          <p:cNvSpPr txBox="1"/>
+          <p:nvPr/>
+        </p:nvSpPr>
+        <p:spPr>
+          <a:xfrm>
+            <a:off x="3352800" y="3733800"/>
+            <a:ext cx="381000" cy="338554"/>
+          </a:xfrm>
+          <a:prstGeom prst="rect">
+            <a:avLst/>
+          </a:prstGeom>
+          <a:noFill/>
+        </p:spPr>
+        <p:txBody>
+          <a:bodyPr wrap="square" rtlCol="0">
+            <a:spAutoFit/>
+          </a:bodyPr>
+          <a:lstStyle/>
+          <a:p>
+            <a:r>
+              <a:rPr lang="en-US" sz="800" dirty="0" smtClean="0"/>
+              <a:t>2,1 </a:t>
+            </a:r>
+          </a:p>
+          <a:p>
+            <a:r>
+              <a:rPr lang="en-US" sz="800" dirty="0" err="1" smtClean="0"/>
+              <a:t>bd</a:t>
+            </a:r>
+            <a:endParaRPr lang="en-US" sz="800" dirty="0"/>
+          </a:p>
+        </p:txBody>
+      </p:sp>
+      <p:sp>
+        <p:nvSpPr>
+          <p:cNvPr id="290" name="TextBox 289"/>
+          <p:cNvSpPr txBox="1"/>
+          <p:nvPr/>
+        </p:nvSpPr>
+        <p:spPr>
+          <a:xfrm>
+            <a:off x="3048000" y="3733800"/>
+            <a:ext cx="381000" cy="338554"/>
+          </a:xfrm>
+          <a:prstGeom prst="rect">
+            <a:avLst/>
+          </a:prstGeom>
+          <a:noFill/>
+        </p:spPr>
+        <p:txBody>
+          <a:bodyPr wrap="square" rtlCol="0">
+            <a:spAutoFit/>
+          </a:bodyPr>
+          <a:lstStyle/>
+          <a:p>
+            <a:r>
+              <a:rPr lang="en-US" sz="800" dirty="0" smtClean="0"/>
+              <a:t>0,1 </a:t>
+            </a:r>
+          </a:p>
+          <a:p>
+            <a:r>
+              <a:rPr lang="en-US" sz="800" dirty="0" smtClean="0"/>
+              <a:t>ac</a:t>
+            </a:r>
+            <a:endParaRPr lang="en-US" sz="800" dirty="0"/>
+          </a:p>
+        </p:txBody>
+      </p:sp>
+      <p:sp>
+        <p:nvSpPr>
+          <p:cNvPr id="291" name="TextBox 290"/>
+          <p:cNvSpPr txBox="1"/>
+          <p:nvPr/>
+        </p:nvSpPr>
+        <p:spPr>
+          <a:xfrm>
+            <a:off x="3886200" y="3657600"/>
+            <a:ext cx="439544" cy="215444"/>
+          </a:xfrm>
+          <a:prstGeom prst="rect">
+            <a:avLst/>
+          </a:prstGeom>
+          <a:noFill/>
+        </p:spPr>
+        <p:txBody>
+          <a:bodyPr wrap="none" rtlCol="0">
+            <a:spAutoFit/>
+          </a:bodyPr>
+          <a:lstStyle/>
+          <a:p>
+            <a:r>
+              <a:rPr lang="en-US" sz="800" dirty="0" smtClean="0"/>
+              <a:t>1,0 </a:t>
+            </a:r>
+            <a:r>
+              <a:rPr lang="en-US" sz="800" dirty="0" err="1" smtClean="0"/>
+              <a:t>ab</a:t>
+            </a:r>
+            <a:endParaRPr lang="en-US" sz="800" dirty="0"/>
+          </a:p>
+        </p:txBody>
+      </p:sp>
+      <p:sp>
+        <p:nvSpPr>
+          <p:cNvPr id="292" name="TextBox 291"/>
+          <p:cNvSpPr txBox="1"/>
+          <p:nvPr/>
+        </p:nvSpPr>
+        <p:spPr>
+          <a:xfrm>
+            <a:off x="3886200" y="3962400"/>
+            <a:ext cx="433132" cy="215444"/>
+          </a:xfrm>
+          <a:prstGeom prst="rect">
+            <a:avLst/>
+          </a:prstGeom>
+          <a:noFill/>
+        </p:spPr>
+        <p:txBody>
+          <a:bodyPr wrap="none" rtlCol="0">
+            <a:spAutoFit/>
+          </a:bodyPr>
+          <a:lstStyle/>
+          <a:p>
+            <a:r>
+              <a:rPr lang="en-US" sz="800" dirty="0" smtClean="0"/>
+              <a:t>1,2 </a:t>
+            </a:r>
+            <a:r>
+              <a:rPr lang="en-US" sz="800" dirty="0" err="1" smtClean="0"/>
+              <a:t>cd</a:t>
+            </a:r>
+            <a:endParaRPr lang="en-US" sz="800" dirty="0"/>
+          </a:p>
+        </p:txBody>
+      </p:sp>
+      <p:sp>
+        <p:nvSpPr>
+          <p:cNvPr id="293" name="TextBox 292"/>
+          <p:cNvSpPr txBox="1"/>
+          <p:nvPr/>
+        </p:nvSpPr>
+        <p:spPr>
+          <a:xfrm>
+            <a:off x="5257800" y="3657600"/>
+            <a:ext cx="537327" cy="215444"/>
+          </a:xfrm>
+          <a:prstGeom prst="rect">
+            <a:avLst/>
+          </a:prstGeom>
+          <a:noFill/>
+        </p:spPr>
+        <p:txBody>
+          <a:bodyPr wrap="none" rtlCol="0">
+            <a:spAutoFit/>
+          </a:bodyPr>
+          <a:lstStyle/>
+          <a:p>
+            <a:r>
+              <a:rPr lang="en-US" sz="800" dirty="0" smtClean="0"/>
+              <a:t>0,0 </a:t>
+            </a:r>
+            <a:r>
+              <a:rPr lang="en-US" sz="800" dirty="0" err="1" smtClean="0"/>
+              <a:t>abcd</a:t>
+            </a:r>
+            <a:endParaRPr lang="en-US" sz="800" dirty="0"/>
+          </a:p>
+        </p:txBody>
+      </p:sp>
+      <p:sp>
+        <p:nvSpPr>
+          <p:cNvPr id="294" name="TextBox 293"/>
+          <p:cNvSpPr txBox="1"/>
+          <p:nvPr/>
+        </p:nvSpPr>
+        <p:spPr>
+          <a:xfrm>
+            <a:off x="5530850" y="3981450"/>
+            <a:ext cx="389850" cy="215444"/>
+          </a:xfrm>
+          <a:prstGeom prst="rect">
+            <a:avLst/>
+          </a:prstGeom>
+          <a:noFill/>
+        </p:spPr>
+        <p:txBody>
+          <a:bodyPr wrap="none" rtlCol="0">
+            <a:spAutoFit/>
+          </a:bodyPr>
+          <a:lstStyle/>
+          <a:p>
+            <a:r>
+              <a:rPr lang="en-US" sz="800" dirty="0" smtClean="0"/>
+              <a:t>0,3 d</a:t>
+            </a:r>
+            <a:endParaRPr lang="en-US" sz="800" dirty="0"/>
+          </a:p>
+        </p:txBody>
+      </p:sp>
+      <p:sp>
+        <p:nvSpPr>
+          <p:cNvPr id="295" name="TextBox 294"/>
+          <p:cNvSpPr txBox="1"/>
+          <p:nvPr/>
+        </p:nvSpPr>
+        <p:spPr>
+          <a:xfrm>
+            <a:off x="5334000" y="4419600"/>
+            <a:ext cx="439544" cy="215444"/>
+          </a:xfrm>
+          <a:prstGeom prst="rect">
+            <a:avLst/>
+          </a:prstGeom>
+          <a:noFill/>
+        </p:spPr>
+        <p:txBody>
+          <a:bodyPr wrap="none" rtlCol="0">
+            <a:spAutoFit/>
+          </a:bodyPr>
+          <a:lstStyle/>
+          <a:p>
+            <a:r>
+              <a:rPr lang="en-US" sz="800" dirty="0" smtClean="0"/>
+              <a:t>0,0 </a:t>
+            </a:r>
+            <a:r>
+              <a:rPr lang="en-US" sz="800" dirty="0" err="1" smtClean="0"/>
+              <a:t>ab</a:t>
+            </a:r>
+            <a:endParaRPr lang="en-US" sz="800" dirty="0"/>
+          </a:p>
+        </p:txBody>
+      </p:sp>
+      <p:sp>
+        <p:nvSpPr>
+          <p:cNvPr id="296" name="TextBox 295"/>
+          <p:cNvSpPr txBox="1"/>
+          <p:nvPr/>
+        </p:nvSpPr>
+        <p:spPr>
+          <a:xfrm>
+            <a:off x="5257800" y="4648200"/>
+            <a:ext cx="433132" cy="215444"/>
+          </a:xfrm>
+          <a:prstGeom prst="rect">
+            <a:avLst/>
+          </a:prstGeom>
+          <a:noFill/>
+        </p:spPr>
+        <p:txBody>
+          <a:bodyPr wrap="none" rtlCol="0">
+            <a:spAutoFit/>
+          </a:bodyPr>
+          <a:lstStyle/>
+          <a:p>
+            <a:r>
+              <a:rPr lang="en-US" sz="800" dirty="0" smtClean="0"/>
+              <a:t>0,2 </a:t>
+            </a:r>
+            <a:r>
+              <a:rPr lang="en-US" sz="800" dirty="0" err="1" smtClean="0"/>
+              <a:t>cd</a:t>
+            </a:r>
+            <a:endParaRPr lang="en-US" sz="800" dirty="0"/>
+          </a:p>
+        </p:txBody>
+      </p:sp>
+      <p:sp>
+        <p:nvSpPr>
+          <p:cNvPr id="297" name="TextBox 296"/>
+          <p:cNvSpPr txBox="1"/>
+          <p:nvPr/>
+        </p:nvSpPr>
+        <p:spPr>
+          <a:xfrm>
+            <a:off x="5543550" y="2533650"/>
+            <a:ext cx="389850" cy="215444"/>
+          </a:xfrm>
+          <a:prstGeom prst="rect">
+            <a:avLst/>
+          </a:prstGeom>
+          <a:noFill/>
+        </p:spPr>
+        <p:txBody>
+          <a:bodyPr wrap="none" rtlCol="0">
+            <a:spAutoFit/>
+          </a:bodyPr>
+          <a:lstStyle/>
+          <a:p>
+            <a:r>
+              <a:rPr lang="en-US" sz="800" dirty="0" smtClean="0"/>
+              <a:t>0,3 d</a:t>
+            </a:r>
+            <a:endParaRPr lang="en-US" sz="800" dirty="0"/>
+          </a:p>
+        </p:txBody>
+      </p:sp>
+      <p:sp>
+        <p:nvSpPr>
+          <p:cNvPr id="298" name="TextBox 297"/>
+          <p:cNvSpPr txBox="1"/>
+          <p:nvPr/>
+        </p:nvSpPr>
+        <p:spPr>
+          <a:xfrm>
+            <a:off x="5543550" y="2152650"/>
+            <a:ext cx="389850" cy="215444"/>
+          </a:xfrm>
+          <a:prstGeom prst="rect">
+            <a:avLst/>
+          </a:prstGeom>
+          <a:noFill/>
+        </p:spPr>
+        <p:txBody>
+          <a:bodyPr wrap="none" rtlCol="0">
+            <a:spAutoFit/>
+          </a:bodyPr>
+          <a:lstStyle/>
+          <a:p>
+            <a:r>
+              <a:rPr lang="en-US" sz="800" dirty="0" smtClean="0"/>
+              <a:t>0,4 b</a:t>
+            </a:r>
+            <a:endParaRPr lang="en-US" sz="800" dirty="0"/>
+          </a:p>
+        </p:txBody>
+      </p:sp>
+      <p:sp>
+        <p:nvSpPr>
+          <p:cNvPr id="299" name="TextBox 298"/>
+          <p:cNvSpPr txBox="1"/>
+          <p:nvPr/>
+        </p:nvSpPr>
+        <p:spPr>
+          <a:xfrm>
+            <a:off x="4800600" y="2514600"/>
+            <a:ext cx="381000" cy="215444"/>
+          </a:xfrm>
+          <a:prstGeom prst="rect">
+            <a:avLst/>
+          </a:prstGeom>
+          <a:noFill/>
+        </p:spPr>
+        <p:txBody>
+          <a:bodyPr wrap="square" rtlCol="0">
+            <a:spAutoFit/>
+          </a:bodyPr>
+          <a:lstStyle/>
+          <a:p>
+            <a:r>
+              <a:rPr lang="en-US" sz="800" dirty="0" smtClean="0"/>
+              <a:t>0,3d</a:t>
+            </a:r>
+            <a:endParaRPr lang="en-US" sz="800" dirty="0"/>
+          </a:p>
+        </p:txBody>
+      </p:sp>
+      <p:sp>
+        <p:nvSpPr>
+          <p:cNvPr id="300" name="TextBox 299"/>
+          <p:cNvSpPr txBox="1"/>
+          <p:nvPr/>
+        </p:nvSpPr>
+        <p:spPr>
+          <a:xfrm>
+            <a:off x="3810000" y="3200400"/>
+            <a:ext cx="381000" cy="338554"/>
+          </a:xfrm>
+          <a:prstGeom prst="rect">
+            <a:avLst/>
+          </a:prstGeom>
+          <a:noFill/>
+        </p:spPr>
+        <p:txBody>
+          <a:bodyPr wrap="square" rtlCol="0">
+            <a:spAutoFit/>
+          </a:bodyPr>
+          <a:lstStyle/>
+          <a:p>
+            <a:r>
+              <a:rPr lang="en-US" sz="800" dirty="0" smtClean="0"/>
+              <a:t>1,3 </a:t>
+            </a:r>
+          </a:p>
+          <a:p>
+            <a:r>
+              <a:rPr lang="en-US" sz="800" dirty="0" smtClean="0"/>
+              <a:t>c</a:t>
+            </a:r>
+            <a:endParaRPr lang="en-US" sz="800" dirty="0"/>
+          </a:p>
+        </p:txBody>
+      </p:sp>
+      <p:sp>
+        <p:nvSpPr>
+          <p:cNvPr id="301" name="TextBox 300"/>
+          <p:cNvSpPr txBox="1"/>
+          <p:nvPr/>
+        </p:nvSpPr>
+        <p:spPr>
+          <a:xfrm>
+            <a:off x="4495800" y="2895600"/>
+            <a:ext cx="381000" cy="338554"/>
+          </a:xfrm>
+          <a:prstGeom prst="rect">
+            <a:avLst/>
+          </a:prstGeom>
+          <a:noFill/>
+        </p:spPr>
+        <p:txBody>
+          <a:bodyPr wrap="square" rtlCol="0">
+            <a:spAutoFit/>
+          </a:bodyPr>
+          <a:lstStyle/>
+          <a:p>
+            <a:r>
+              <a:rPr lang="en-US" sz="800" dirty="0" smtClean="0"/>
+              <a:t>1,4 </a:t>
+            </a:r>
+          </a:p>
+          <a:p>
+            <a:r>
+              <a:rPr lang="en-US" sz="800" dirty="0" smtClean="0"/>
+              <a:t>a</a:t>
+            </a:r>
+            <a:endParaRPr lang="en-US" sz="800" dirty="0"/>
+          </a:p>
+        </p:txBody>
+      </p:sp>
+      <p:sp>
+        <p:nvSpPr>
+          <p:cNvPr id="302" name="TextBox 301"/>
+          <p:cNvSpPr txBox="1"/>
+          <p:nvPr/>
+        </p:nvSpPr>
+        <p:spPr>
+          <a:xfrm>
+            <a:off x="3810000" y="4724400"/>
+            <a:ext cx="482824" cy="215444"/>
+          </a:xfrm>
+          <a:prstGeom prst="rect">
+            <a:avLst/>
+          </a:prstGeom>
+          <a:noFill/>
+        </p:spPr>
+        <p:txBody>
+          <a:bodyPr wrap="none" rtlCol="0">
+            <a:spAutoFit/>
+          </a:bodyPr>
+          <a:lstStyle/>
+          <a:p>
+            <a:r>
+              <a:rPr lang="en-US" sz="800" dirty="0" smtClean="0"/>
+              <a:t>0,2 </a:t>
+            </a:r>
+            <a:r>
+              <a:rPr lang="en-US" sz="800" dirty="0" err="1" smtClean="0"/>
+              <a:t>acd</a:t>
+            </a:r>
+            <a:endParaRPr lang="en-US" sz="800" dirty="0"/>
+          </a:p>
+        </p:txBody>
+      </p:sp>
+      <p:sp>
+        <p:nvSpPr>
+          <p:cNvPr id="303" name="TextBox 302"/>
+          <p:cNvSpPr txBox="1"/>
+          <p:nvPr/>
+        </p:nvSpPr>
+        <p:spPr>
+          <a:xfrm>
+            <a:off x="4064000" y="4343400"/>
+            <a:ext cx="389850" cy="215444"/>
+          </a:xfrm>
+          <a:prstGeom prst="rect">
+            <a:avLst/>
+          </a:prstGeom>
+          <a:noFill/>
+        </p:spPr>
+        <p:txBody>
+          <a:bodyPr wrap="none" rtlCol="0">
+            <a:spAutoFit/>
+          </a:bodyPr>
+          <a:lstStyle/>
+          <a:p>
+            <a:r>
+              <a:rPr lang="en-US" sz="800" dirty="0" smtClean="0"/>
+              <a:t>0,4 b</a:t>
+            </a:r>
+            <a:endParaRPr lang="en-US" sz="800" dirty="0"/>
+          </a:p>
+        </p:txBody>
+      </p:sp>
+      <p:sp>
+        <p:nvSpPr>
+          <p:cNvPr id="304" name="TextBox 303"/>
+          <p:cNvSpPr txBox="1"/>
+          <p:nvPr/>
+        </p:nvSpPr>
+        <p:spPr>
+          <a:xfrm>
+            <a:off x="4495800" y="4495800"/>
+            <a:ext cx="335348" cy="338554"/>
+          </a:xfrm>
+          <a:prstGeom prst="rect">
+            <a:avLst/>
+          </a:prstGeom>
+          <a:noFill/>
+        </p:spPr>
+        <p:txBody>
+          <a:bodyPr wrap="none" rtlCol="0">
+            <a:spAutoFit/>
+          </a:bodyPr>
+          <a:lstStyle/>
+          <a:p>
+            <a:r>
+              <a:rPr lang="en-US" sz="800" dirty="0" smtClean="0"/>
+              <a:t>0,0 </a:t>
+            </a:r>
+          </a:p>
+          <a:p>
+            <a:r>
+              <a:rPr lang="en-US" sz="800" dirty="0" smtClean="0"/>
+              <a:t>ac</a:t>
+            </a:r>
+            <a:endParaRPr lang="en-US" sz="800" dirty="0"/>
+          </a:p>
+        </p:txBody>
+      </p:sp>
+      <p:sp>
+        <p:nvSpPr>
+          <p:cNvPr id="305" name="TextBox 304"/>
+          <p:cNvSpPr txBox="1"/>
+          <p:nvPr/>
+        </p:nvSpPr>
+        <p:spPr>
+          <a:xfrm>
+            <a:off x="4800600" y="4495800"/>
+            <a:ext cx="335348" cy="338554"/>
+          </a:xfrm>
+          <a:prstGeom prst="rect">
+            <a:avLst/>
+          </a:prstGeom>
+          <a:noFill/>
+        </p:spPr>
+        <p:txBody>
+          <a:bodyPr wrap="none" rtlCol="0">
+            <a:spAutoFit/>
+          </a:bodyPr>
+          <a:lstStyle/>
+          <a:p>
+            <a:r>
+              <a:rPr lang="en-US" sz="800" dirty="0" smtClean="0"/>
+              <a:t>2,0 </a:t>
+            </a:r>
+          </a:p>
+          <a:p>
+            <a:r>
+              <a:rPr lang="en-US" sz="800" dirty="0" err="1" smtClean="0"/>
+              <a:t>bd</a:t>
+            </a:r>
+            <a:endParaRPr lang="en-US" sz="800" dirty="0"/>
+          </a:p>
+        </p:txBody>
+      </p:sp>
+      <p:sp>
+        <p:nvSpPr>
+          <p:cNvPr id="306" name="TextBox 305"/>
+          <p:cNvSpPr txBox="1"/>
+          <p:nvPr/>
+        </p:nvSpPr>
+        <p:spPr>
+          <a:xfrm>
+            <a:off x="5943600" y="4572000"/>
+            <a:ext cx="335348" cy="338554"/>
+          </a:xfrm>
+          <a:prstGeom prst="rect">
+            <a:avLst/>
+          </a:prstGeom>
+          <a:noFill/>
+        </p:spPr>
+        <p:txBody>
+          <a:bodyPr wrap="none" rtlCol="0">
+            <a:spAutoFit/>
+          </a:bodyPr>
+          <a:lstStyle/>
+          <a:p>
+            <a:r>
+              <a:rPr lang="en-US" sz="800" dirty="0" smtClean="0"/>
+              <a:t>0,2 </a:t>
+            </a:r>
+          </a:p>
+          <a:p>
+            <a:r>
+              <a:rPr lang="en-US" sz="800" dirty="0" smtClean="0"/>
+              <a:t>ac</a:t>
+            </a:r>
+            <a:endParaRPr lang="en-US" sz="800" dirty="0"/>
+          </a:p>
+        </p:txBody>
+      </p:sp>
+      <p:sp>
+        <p:nvSpPr>
+          <p:cNvPr id="307" name="TextBox 306"/>
+          <p:cNvSpPr txBox="1"/>
+          <p:nvPr/>
+        </p:nvSpPr>
+        <p:spPr>
+          <a:xfrm>
+            <a:off x="6248400" y="4572000"/>
+            <a:ext cx="336952" cy="338554"/>
+          </a:xfrm>
+          <a:prstGeom prst="rect">
+            <a:avLst/>
+          </a:prstGeom>
+          <a:noFill/>
+        </p:spPr>
+        <p:txBody>
+          <a:bodyPr wrap="none" rtlCol="0">
+            <a:spAutoFit/>
+          </a:bodyPr>
+          <a:lstStyle/>
+          <a:p>
+            <a:r>
+              <a:rPr lang="en-US" sz="800" dirty="0" smtClean="0"/>
+              <a:t>2,2 </a:t>
+            </a:r>
+          </a:p>
+          <a:p>
+            <a:r>
+              <a:rPr lang="en-US" sz="800" dirty="0" err="1" smtClean="0"/>
+              <a:t>bd</a:t>
+            </a:r>
+            <a:endParaRPr lang="en-US" sz="800" dirty="0"/>
+          </a:p>
+        </p:txBody>
+      </p:sp>
+      <p:sp>
+        <p:nvSpPr>
+          <p:cNvPr id="308" name="TextBox 307"/>
+          <p:cNvSpPr txBox="1"/>
+          <p:nvPr/>
+        </p:nvSpPr>
+        <p:spPr>
+          <a:xfrm>
+            <a:off x="6781800" y="4419600"/>
+            <a:ext cx="439544" cy="215444"/>
+          </a:xfrm>
+          <a:prstGeom prst="rect">
+            <a:avLst/>
+          </a:prstGeom>
+          <a:noFill/>
+        </p:spPr>
+        <p:txBody>
+          <a:bodyPr wrap="none" rtlCol="0">
+            <a:spAutoFit/>
+          </a:bodyPr>
+          <a:lstStyle/>
+          <a:p>
+            <a:r>
+              <a:rPr lang="en-US" sz="800" dirty="0" smtClean="0"/>
+              <a:t>2,0 </a:t>
+            </a:r>
+            <a:r>
+              <a:rPr lang="en-US" sz="800" dirty="0" err="1" smtClean="0"/>
+              <a:t>ab</a:t>
+            </a:r>
+            <a:endParaRPr lang="en-US" sz="800" dirty="0"/>
+          </a:p>
+        </p:txBody>
+      </p:sp>
+      <p:sp>
+        <p:nvSpPr>
+          <p:cNvPr id="309" name="TextBox 308"/>
+          <p:cNvSpPr txBox="1"/>
+          <p:nvPr/>
+        </p:nvSpPr>
+        <p:spPr>
+          <a:xfrm>
+            <a:off x="6788150" y="4654550"/>
+            <a:ext cx="433132" cy="215444"/>
+          </a:xfrm>
+          <a:prstGeom prst="rect">
+            <a:avLst/>
+          </a:prstGeom>
+          <a:noFill/>
+        </p:spPr>
+        <p:txBody>
+          <a:bodyPr wrap="none" rtlCol="0">
+            <a:spAutoFit/>
+          </a:bodyPr>
+          <a:lstStyle/>
+          <a:p>
+            <a:r>
+              <a:rPr lang="en-US" sz="800" dirty="0" smtClean="0"/>
+              <a:t>2,2 </a:t>
+            </a:r>
+            <a:r>
+              <a:rPr lang="en-US" sz="800" dirty="0" err="1" smtClean="0"/>
+              <a:t>cd</a:t>
+            </a:r>
+            <a:endParaRPr lang="en-US" sz="800" dirty="0"/>
+          </a:p>
+        </p:txBody>
+      </p:sp>
+      <p:sp>
+        <p:nvSpPr>
+          <p:cNvPr id="310" name="TextBox 309"/>
+          <p:cNvSpPr txBox="1"/>
+          <p:nvPr/>
+        </p:nvSpPr>
+        <p:spPr>
+          <a:xfrm>
+            <a:off x="7391400" y="4343400"/>
+            <a:ext cx="385042" cy="215444"/>
+          </a:xfrm>
+          <a:prstGeom prst="rect">
+            <a:avLst/>
+          </a:prstGeom>
+          <a:noFill/>
+        </p:spPr>
+        <p:txBody>
+          <a:bodyPr wrap="none" rtlCol="0">
+            <a:spAutoFit/>
+          </a:bodyPr>
+          <a:lstStyle/>
+          <a:p>
+            <a:r>
+              <a:rPr lang="en-US" sz="800" dirty="0" smtClean="0"/>
+              <a:t>0,0 a</a:t>
+            </a:r>
+            <a:endParaRPr lang="en-US" sz="800" dirty="0"/>
+          </a:p>
+        </p:txBody>
+      </p:sp>
+      <p:sp>
+        <p:nvSpPr>
+          <p:cNvPr id="311" name="TextBox 310"/>
+          <p:cNvSpPr txBox="1"/>
+          <p:nvPr/>
+        </p:nvSpPr>
+        <p:spPr>
+          <a:xfrm>
+            <a:off x="7696200" y="4343400"/>
+            <a:ext cx="389850" cy="215444"/>
+          </a:xfrm>
+          <a:prstGeom prst="rect">
+            <a:avLst/>
+          </a:prstGeom>
+          <a:noFill/>
+        </p:spPr>
+        <p:txBody>
+          <a:bodyPr wrap="none" rtlCol="0">
+            <a:spAutoFit/>
+          </a:bodyPr>
+          <a:lstStyle/>
+          <a:p>
+            <a:r>
+              <a:rPr lang="en-US" sz="800" dirty="0" smtClean="0"/>
+              <a:t>2,0 b</a:t>
+            </a:r>
+            <a:endParaRPr lang="en-US" sz="800" dirty="0"/>
+          </a:p>
+        </p:txBody>
+      </p:sp>
+      <p:sp>
+        <p:nvSpPr>
+          <p:cNvPr id="312" name="TextBox 311"/>
+          <p:cNvSpPr txBox="1"/>
+          <p:nvPr/>
+        </p:nvSpPr>
+        <p:spPr>
+          <a:xfrm>
+            <a:off x="7391400" y="4724400"/>
+            <a:ext cx="378630" cy="215444"/>
+          </a:xfrm>
+          <a:prstGeom prst="rect">
+            <a:avLst/>
+          </a:prstGeom>
+          <a:noFill/>
+        </p:spPr>
+        <p:txBody>
+          <a:bodyPr wrap="none" rtlCol="0">
+            <a:spAutoFit/>
+          </a:bodyPr>
+          <a:lstStyle/>
+          <a:p>
+            <a:r>
+              <a:rPr lang="en-US" sz="800" dirty="0" smtClean="0"/>
+              <a:t>0,2 c</a:t>
+            </a:r>
+            <a:endParaRPr lang="en-US" sz="800" dirty="0"/>
+          </a:p>
+        </p:txBody>
+      </p:sp>
+      <p:sp>
+        <p:nvSpPr>
+          <p:cNvPr id="313" name="TextBox 312"/>
+          <p:cNvSpPr txBox="1"/>
+          <p:nvPr/>
+        </p:nvSpPr>
+        <p:spPr>
+          <a:xfrm>
+            <a:off x="7696200" y="4724400"/>
+            <a:ext cx="389850" cy="215444"/>
+          </a:xfrm>
+          <a:prstGeom prst="rect">
+            <a:avLst/>
+          </a:prstGeom>
+          <a:noFill/>
+        </p:spPr>
+        <p:txBody>
+          <a:bodyPr wrap="none" rtlCol="0">
+            <a:spAutoFit/>
+          </a:bodyPr>
+          <a:lstStyle/>
+          <a:p>
+            <a:r>
+              <a:rPr lang="en-US" sz="800" smtClean="0"/>
+              <a:t>2,2 d</a:t>
+            </a:r>
+            <a:endParaRPr lang="en-US" sz="800" dirty="0"/>
+          </a:p>
+        </p:txBody>
+      </p:sp>
+      <p:sp>
+        <p:nvSpPr>
+          <p:cNvPr id="2" name="TextBox 1"/>
+          <p:cNvSpPr txBox="1"/>
+          <p:nvPr/>
+        </p:nvSpPr>
+        <p:spPr>
+          <a:xfrm>
+            <a:off x="3076690" y="218331"/>
+            <a:ext cx="5564344" cy="369332"/>
+          </a:xfrm>
+          <a:prstGeom prst="rect">
+            <a:avLst/>
+          </a:prstGeom>
+          <a:noFill/>
+        </p:spPr>
+        <p:txBody>
+          <a:bodyPr wrap="none" rtlCol="0">
+            <a:spAutoFit/>
+          </a:bodyPr>
+          <a:lstStyle/>
+          <a:p>
+            <a:r>
+              <a:rPr lang="en-US" dirty="0" smtClean="0"/>
+              <a:t>0             1            2            3           4           5            6             7</a:t>
+            </a:r>
+            <a:endParaRPr lang="sk-SK" dirty="0"/>
+          </a:p>
+        </p:txBody>
+      </p:sp>
+      <p:sp>
+        <p:nvSpPr>
+          <p:cNvPr id="3" name="TextBox 2"/>
+          <p:cNvSpPr txBox="1"/>
+          <p:nvPr/>
+        </p:nvSpPr>
+        <p:spPr>
+          <a:xfrm>
+            <a:off x="2716200" y="387643"/>
+            <a:ext cx="274320" cy="4579715"/>
+          </a:xfrm>
+          <a:prstGeom prst="rect">
+            <a:avLst/>
+          </a:prstGeom>
+          <a:noFill/>
+        </p:spPr>
+        <p:txBody>
+          <a:bodyPr wrap="square" rtlCol="0">
+            <a:spAutoFit/>
+          </a:bodyPr>
+          <a:lstStyle/>
+          <a:p>
+            <a:pPr>
+              <a:lnSpc>
+                <a:spcPct val="270000"/>
+              </a:lnSpc>
+            </a:pPr>
+            <a:r>
+              <a:rPr lang="en-US" dirty="0" smtClean="0"/>
+              <a:t>0</a:t>
+            </a:r>
+          </a:p>
+          <a:p>
+            <a:pPr>
+              <a:lnSpc>
+                <a:spcPct val="270000"/>
+              </a:lnSpc>
+            </a:pPr>
+            <a:r>
+              <a:rPr lang="en-US" dirty="0" smtClean="0"/>
+              <a:t>1</a:t>
+            </a:r>
+          </a:p>
+          <a:p>
+            <a:pPr>
+              <a:lnSpc>
+                <a:spcPct val="270000"/>
+              </a:lnSpc>
+            </a:pPr>
+            <a:r>
+              <a:rPr lang="en-US" dirty="0" smtClean="0"/>
+              <a:t>2</a:t>
+            </a:r>
+          </a:p>
+          <a:p>
+            <a:pPr>
+              <a:lnSpc>
+                <a:spcPct val="270000"/>
+              </a:lnSpc>
+            </a:pPr>
+            <a:r>
+              <a:rPr lang="en-US" dirty="0" smtClean="0"/>
+              <a:t>3</a:t>
+            </a:r>
+          </a:p>
+          <a:p>
+            <a:pPr>
+              <a:lnSpc>
+                <a:spcPct val="270000"/>
+              </a:lnSpc>
+            </a:pPr>
+            <a:r>
+              <a:rPr lang="en-US" dirty="0" smtClean="0"/>
+              <a:t>4</a:t>
+            </a:r>
+          </a:p>
+          <a:p>
+            <a:pPr>
+              <a:lnSpc>
+                <a:spcPct val="270000"/>
+              </a:lnSpc>
+            </a:pPr>
+            <a:r>
+              <a:rPr lang="en-US" dirty="0" smtClean="0"/>
+              <a:t>5</a:t>
+            </a:r>
+            <a:endParaRPr lang="sk-SK" dirty="0"/>
+          </a:p>
+        </p:txBody>
+      </p:sp>
+      <p:sp>
+        <p:nvSpPr>
+          <p:cNvPr id="273" name="Rectangle 272"/>
+          <p:cNvSpPr/>
+          <p:nvPr/>
+        </p:nvSpPr>
+        <p:spPr>
+          <a:xfrm>
+            <a:off x="1295400" y="990600"/>
+            <a:ext cx="990600" cy="990600"/>
+          </a:xfrm>
+          <a:prstGeom prst="rect">
+            <a:avLst/>
+          </a:prstGeom>
+          <a:noFill/>
+          <a:ln>
+            <a:solidFill>
+              <a:schemeClr val="accent2">
+                <a:lumMod val="75000"/>
+              </a:schemeClr>
+            </a:solidFill>
+          </a:ln>
+        </p:spPr>
+        <p:style>
+          <a:lnRef idx="2">
+            <a:schemeClr val="accent1">
+              <a:shade val="50000"/>
+            </a:schemeClr>
+          </a:lnRef>
+          <a:fillRef idx="1">
+            <a:schemeClr val="accent1"/>
+          </a:fillRef>
+          <a:effectRef idx="0">
+            <a:schemeClr val="accent1"/>
+          </a:effectRef>
+          <a:fontRef idx="minor">
+            <a:schemeClr val="lt1"/>
+          </a:fontRef>
+        </p:style>
+        <p:txBody>
+          <a:bodyPr rtlCol="0" anchor="ctr"/>
+          <a:lstStyle/>
+          <a:p>
+            <a:pPr algn="ctr"/>
+            <a:endParaRPr lang="en-US"/>
+          </a:p>
+        </p:txBody>
+      </p:sp>
+      <p:sp>
+        <p:nvSpPr>
+          <p:cNvPr id="314" name="TextBox 313"/>
+          <p:cNvSpPr txBox="1"/>
+          <p:nvPr/>
+        </p:nvSpPr>
+        <p:spPr>
+          <a:xfrm>
+            <a:off x="3810000" y="2895600"/>
+            <a:ext cx="381000" cy="338554"/>
+          </a:xfrm>
+          <a:prstGeom prst="rect">
+            <a:avLst/>
+          </a:prstGeom>
+          <a:noFill/>
+        </p:spPr>
+        <p:txBody>
+          <a:bodyPr wrap="square" rtlCol="0">
+            <a:spAutoFit/>
+          </a:bodyPr>
+          <a:lstStyle/>
+          <a:p>
+            <a:r>
+              <a:rPr lang="en-US" sz="800" dirty="0" smtClean="0"/>
+              <a:t>2</a:t>
+            </a:r>
+            <a:r>
+              <a:rPr lang="en-US" sz="800" dirty="0" smtClean="0"/>
+              <a:t>,2 </a:t>
+            </a:r>
+            <a:endParaRPr lang="en-US" sz="800" dirty="0" smtClean="0"/>
+          </a:p>
+          <a:p>
+            <a:r>
+              <a:rPr lang="en-US" sz="800" dirty="0" smtClean="0"/>
+              <a:t>a</a:t>
+            </a:r>
+            <a:endParaRPr lang="en-US" sz="800" dirty="0"/>
+          </a:p>
+        </p:txBody>
+      </p:sp>
+      <p:cxnSp>
+        <p:nvCxnSpPr>
+          <p:cNvPr id="316" name="Straight Connector 315"/>
+          <p:cNvCxnSpPr/>
+          <p:nvPr/>
+        </p:nvCxnSpPr>
+        <p:spPr>
+          <a:xfrm>
+            <a:off x="3810000" y="3200400"/>
+            <a:ext cx="266700" cy="1588"/>
+          </a:xfrm>
+          <a:prstGeom prst="line">
+            <a:avLst/>
+          </a:prstGeom>
+        </p:spPr>
+        <p:style>
+          <a:lnRef idx="1">
+            <a:schemeClr val="accent1"/>
+          </a:lnRef>
+          <a:fillRef idx="0">
+            <a:schemeClr val="accent1"/>
+          </a:fillRef>
+          <a:effectRef idx="0">
+            <a:schemeClr val="accent1"/>
+          </a:effectRef>
+          <a:fontRef idx="minor">
+            <a:schemeClr val="tx1"/>
+          </a:fontRef>
+        </p:style>
+      </p:cxnSp>
+      <p:sp>
+        <p:nvSpPr>
+          <p:cNvPr id="317" name="TextBox 316"/>
+          <p:cNvSpPr txBox="1"/>
+          <p:nvPr/>
+        </p:nvSpPr>
+        <p:spPr>
+          <a:xfrm>
+            <a:off x="4495800" y="3200400"/>
+            <a:ext cx="381000" cy="338554"/>
+          </a:xfrm>
+          <a:prstGeom prst="rect">
+            <a:avLst/>
+          </a:prstGeom>
+          <a:noFill/>
+        </p:spPr>
+        <p:txBody>
+          <a:bodyPr wrap="square" rtlCol="0">
+            <a:spAutoFit/>
+          </a:bodyPr>
+          <a:lstStyle/>
+          <a:p>
+            <a:r>
+              <a:rPr lang="en-US" sz="800" dirty="0" smtClean="0"/>
+              <a:t>2,0 </a:t>
+            </a:r>
+            <a:endParaRPr lang="en-US" sz="800" dirty="0" smtClean="0"/>
+          </a:p>
+          <a:p>
+            <a:r>
+              <a:rPr lang="en-US" sz="800" dirty="0" smtClean="0"/>
+              <a:t>c</a:t>
+            </a:r>
+            <a:endParaRPr lang="en-US" sz="800" dirty="0"/>
+          </a:p>
+        </p:txBody>
+      </p:sp>
+      <p:sp>
+        <p:nvSpPr>
+          <p:cNvPr id="318" name="TextBox 317"/>
+          <p:cNvSpPr txBox="1"/>
+          <p:nvPr/>
+        </p:nvSpPr>
+        <p:spPr>
+          <a:xfrm>
+            <a:off x="7010400" y="685800"/>
+            <a:ext cx="389850" cy="215444"/>
+          </a:xfrm>
+          <a:prstGeom prst="rect">
+            <a:avLst/>
+          </a:prstGeom>
+          <a:noFill/>
+        </p:spPr>
+        <p:txBody>
+          <a:bodyPr wrap="none" rtlCol="0">
+            <a:spAutoFit/>
+          </a:bodyPr>
+          <a:lstStyle/>
+          <a:p>
+            <a:r>
+              <a:rPr lang="en-US" sz="800" dirty="0" smtClean="0"/>
+              <a:t>0,2 b</a:t>
+            </a:r>
+            <a:endParaRPr lang="en-US" sz="800" dirty="0"/>
+          </a:p>
+        </p:txBody>
+      </p:sp>
+      <p:sp>
+        <p:nvSpPr>
+          <p:cNvPr id="319" name="TextBox 318"/>
+          <p:cNvSpPr txBox="1"/>
+          <p:nvPr/>
+        </p:nvSpPr>
+        <p:spPr>
+          <a:xfrm>
+            <a:off x="6705600" y="1066800"/>
+            <a:ext cx="356188" cy="215444"/>
+          </a:xfrm>
+          <a:prstGeom prst="rect">
+            <a:avLst/>
+          </a:prstGeom>
+          <a:noFill/>
+        </p:spPr>
+        <p:txBody>
+          <a:bodyPr wrap="none" rtlCol="0">
+            <a:spAutoFit/>
+          </a:bodyPr>
+          <a:lstStyle/>
+          <a:p>
+            <a:r>
+              <a:rPr lang="en-US" sz="800" dirty="0" smtClean="0"/>
+              <a:t>2,0c</a:t>
+            </a:r>
+            <a:endParaRPr lang="en-US" sz="800" dirty="0"/>
+          </a:p>
+        </p:txBody>
+      </p:sp>
+      <p:cxnSp>
+        <p:nvCxnSpPr>
+          <p:cNvPr id="320" name="Straight Connector 319"/>
+          <p:cNvCxnSpPr/>
+          <p:nvPr/>
+        </p:nvCxnSpPr>
+        <p:spPr>
+          <a:xfrm rot="5400000">
+            <a:off x="6706394" y="989806"/>
+            <a:ext cx="609600" cy="1588"/>
           </a:xfrm>
           <a:prstGeom prst="line">
             <a:avLst/>
@@ -10102,14 +11678,14 @@
       </p:cxnSp>
       <p:cxnSp>
         <p:nvCxnSpPr>
-          <p:cNvPr id="275" name="Straight Connector 274"/>
+          <p:cNvPr id="321" name="Straight Connector 320"/>
           <p:cNvCxnSpPr/>
           <p:nvPr/>
         </p:nvCxnSpPr>
         <p:spPr>
-          <a:xfrm rot="5400000" flipH="1" flipV="1">
-            <a:off x="7589044" y="1904206"/>
-            <a:ext cx="304800" cy="1588"/>
+          <a:xfrm>
+            <a:off x="4495800" y="3200400"/>
+            <a:ext cx="266700" cy="1588"/>
           </a:xfrm>
           <a:prstGeom prst="line">
             <a:avLst/>
@@ -10132,14 +11708,14 @@
       </p:cxnSp>
       <p:sp>
         <p:nvSpPr>
-          <p:cNvPr id="276" name="TextBox 275"/>
+          <p:cNvPr id="322" name="TextBox 321"/>
           <p:cNvSpPr txBox="1"/>
           <p:nvPr/>
         </p:nvSpPr>
         <p:spPr>
           <a:xfrm>
-            <a:off x="7467600" y="1447800"/>
-            <a:ext cx="439544" cy="215444"/>
+            <a:off x="4800600" y="2209800"/>
+            <a:ext cx="381000" cy="215444"/>
           </a:xfrm>
           <a:prstGeom prst="rect">
             <a:avLst/>
@@ -10147,18 +11723,14 @@
           <a:noFill/>
         </p:spPr>
         <p:txBody>
-          <a:bodyPr wrap="none" rtlCol="0">
+          <a:bodyPr wrap="square" rtlCol="0">
             <a:spAutoFit/>
           </a:bodyPr>
           <a:lstStyle/>
           <a:p>
             <a:r>
               <a:rPr lang="en-US" sz="800" dirty="0" smtClean="0"/>
-              <a:t>0,4 </a:t>
-            </a:r>
-            <a:r>
-              <a:rPr lang="en-US" sz="800" dirty="0" err="1" smtClean="0"/>
-              <a:t>ab</a:t>
+              <a:t>0,2b</a:t>
             </a:r>
             <a:endParaRPr lang="en-US" sz="800" dirty="0"/>
           </a:p>
@@ -10166,14 +11738,14 @@
       </p:sp>
       <p:sp>
         <p:nvSpPr>
-          <p:cNvPr id="277" name="TextBox 276"/>
+          <p:cNvPr id="323" name="TextBox 322"/>
           <p:cNvSpPr txBox="1"/>
           <p:nvPr/>
         </p:nvSpPr>
         <p:spPr>
           <a:xfrm>
-            <a:off x="7740650" y="1828800"/>
-            <a:ext cx="389850" cy="215444"/>
+            <a:off x="4114800" y="2514600"/>
+            <a:ext cx="381000" cy="215444"/>
           </a:xfrm>
           <a:prstGeom prst="rect">
             <a:avLst/>
@@ -10181,44 +11753,14 @@
           <a:noFill/>
         </p:spPr>
         <p:txBody>
-          <a:bodyPr wrap="none" rtlCol="0">
+          <a:bodyPr wrap="square" rtlCol="0">
             <a:spAutoFit/>
           </a:bodyPr>
           <a:lstStyle/>
           <a:p>
             <a:r>
               <a:rPr lang="en-US" sz="800" dirty="0" smtClean="0"/>
-              <a:t>0,3 d</a:t>
-            </a:r>
-            <a:endParaRPr lang="en-US" sz="800" dirty="0"/>
-          </a:p>
-        </p:txBody>
-      </p:sp>
-      <p:sp>
-        <p:nvSpPr>
-          <p:cNvPr id="278" name="TextBox 277"/>
-          <p:cNvSpPr txBox="1"/>
-          <p:nvPr/>
-        </p:nvSpPr>
-        <p:spPr>
-          <a:xfrm>
-            <a:off x="7359650" y="1828800"/>
-            <a:ext cx="378630" cy="215444"/>
-          </a:xfrm>
-          <a:prstGeom prst="rect">
-            <a:avLst/>
-          </a:prstGeom>
-          <a:noFill/>
-        </p:spPr>
-        <p:txBody>
-          <a:bodyPr wrap="none" rtlCol="0">
-            <a:spAutoFit/>
-          </a:bodyPr>
-          <a:lstStyle/>
-          <a:p>
-            <a:r>
-              <a:rPr lang="en-US" sz="800" dirty="0" smtClean="0"/>
-              <a:t>1,3 c</a:t>
+              <a:t>00d</a:t>
             </a:r>
             <a:endParaRPr lang="en-US" sz="800" dirty="0"/>
           </a:p>
@@ -10226,13 +11768,13 @@
       </p:sp>
       <p:cxnSp>
         <p:nvCxnSpPr>
-          <p:cNvPr id="279" name="Straight Connector 278"/>
+          <p:cNvPr id="324" name="Straight Connector 323"/>
           <p:cNvCxnSpPr/>
           <p:nvPr/>
         </p:nvCxnSpPr>
         <p:spPr>
           <a:xfrm>
-            <a:off x="6629400" y="1752600"/>
+            <a:off x="4114800" y="2438400"/>
             <a:ext cx="304800" cy="1588"/>
           </a:xfrm>
           <a:prstGeom prst="line">
@@ -10254,16 +11796,108 @@
           </a:fontRef>
         </p:style>
       </p:cxnSp>
-      <p:sp>
-        <p:nvSpPr>
-          <p:cNvPr id="280" name="TextBox 279"/>
+      <p:cxnSp>
+        <p:nvCxnSpPr>
+          <p:cNvPr id="325" name="Straight Connector 324"/>
+          <p:cNvCxnSpPr/>
+          <p:nvPr/>
+        </p:nvCxnSpPr>
+        <p:spPr>
+          <a:xfrm rot="5400000">
+            <a:off x="7449344" y="1751806"/>
+            <a:ext cx="609600" cy="1588"/>
+          </a:xfrm>
+          <a:prstGeom prst="line">
+            <a:avLst/>
+          </a:prstGeom>
+        </p:spPr>
+        <p:style>
+          <a:lnRef idx="1">
+            <a:schemeClr val="accent1"/>
+          </a:lnRef>
+          <a:fillRef idx="0">
+            <a:schemeClr val="accent1"/>
+          </a:fillRef>
+          <a:effectRef idx="0">
+            <a:schemeClr val="accent1"/>
+          </a:effectRef>
+          <a:fontRef idx="minor">
+            <a:schemeClr val="tx1"/>
+          </a:fontRef>
+        </p:style>
+      </p:cxnSp>
+      <p:cxnSp>
+        <p:nvCxnSpPr>
+          <p:cNvPr id="327" name="Straight Connector 326"/>
+          <p:cNvCxnSpPr/>
+          <p:nvPr/>
+        </p:nvCxnSpPr>
+        <p:spPr>
+          <a:xfrm rot="5400000">
+            <a:off x="6858000" y="2590800"/>
+            <a:ext cx="304800" cy="1588"/>
+          </a:xfrm>
+          <a:prstGeom prst="line">
+            <a:avLst/>
+          </a:prstGeom>
+        </p:spPr>
+        <p:style>
+          <a:lnRef idx="1">
+            <a:schemeClr val="accent1"/>
+          </a:lnRef>
+          <a:fillRef idx="0">
+            <a:schemeClr val="accent1"/>
+          </a:fillRef>
+          <a:effectRef idx="0">
+            <a:schemeClr val="accent1"/>
+          </a:effectRef>
+          <a:fontRef idx="minor">
+            <a:schemeClr val="tx1"/>
+          </a:fontRef>
+        </p:style>
+      </p:cxnSp>
+      <p:cxnSp>
+        <p:nvCxnSpPr>
+          <p:cNvPr id="329" name="Straight Connector 328"/>
+          <p:cNvCxnSpPr>
+            <a:stCxn id="260" idx="2"/>
+          </p:cNvCxnSpPr>
+          <p:nvPr/>
+        </p:nvCxnSpPr>
+        <p:spPr>
+          <a:xfrm rot="16200000" flipH="1">
+            <a:off x="7609008" y="2579808"/>
+            <a:ext cx="317956" cy="8828"/>
+          </a:xfrm>
+          <a:prstGeom prst="line">
+            <a:avLst/>
+          </a:prstGeom>
+        </p:spPr>
+        <p:style>
+          <a:lnRef idx="1">
+            <a:schemeClr val="accent1"/>
+          </a:lnRef>
+          <a:fillRef idx="0">
+            <a:schemeClr val="accent1"/>
+          </a:fillRef>
+          <a:effectRef idx="0">
+            <a:schemeClr val="accent1"/>
+          </a:effectRef>
+          <a:fontRef idx="minor">
+            <a:schemeClr val="tx1"/>
+          </a:fontRef>
+        </p:style>
+      </p:cxnSp>
+      <p:sp>
+        <p:nvSpPr>
+          <p:cNvPr id="330" name="TextBox 329"/>
           <p:cNvSpPr txBox="1"/>
           <p:nvPr/>
         </p:nvSpPr>
         <p:spPr>
           <a:xfrm>
-            <a:off x="6629400" y="1447800"/>
-            <a:ext cx="385042" cy="215444"/>
+            <a:off x="6705600" y="2514600"/>
+            <a:ext cx="330540" cy="215444"/>
           </a:xfrm>
           <a:prstGeom prst="rect">
             <a:avLst/>
@@ -10278,7 +11912,7 @@
           <a:p>
             <a:r>
               <a:rPr lang="en-US" sz="800" dirty="0" smtClean="0"/>
-              <a:t>1,4 a</a:t>
+              <a:t>20c</a:t>
             </a:r>
             <a:endParaRPr lang="en-US" sz="800" dirty="0"/>
           </a:p>
@@ -10286,14 +11920,14 @@
       </p:sp>
       <p:sp>
         <p:nvSpPr>
-          <p:cNvPr id="281" name="TextBox 280"/>
+          <p:cNvPr id="331" name="TextBox 330"/>
           <p:cNvSpPr txBox="1"/>
           <p:nvPr/>
         </p:nvSpPr>
         <p:spPr>
           <a:xfrm>
-            <a:off x="6629400" y="1828800"/>
-            <a:ext cx="378630" cy="215444"/>
+            <a:off x="7010400" y="2514600"/>
+            <a:ext cx="341760" cy="215444"/>
           </a:xfrm>
           <a:prstGeom prst="rect">
             <a:avLst/>
@@ -10308,7 +11942,7 @@
           <a:p>
             <a:r>
               <a:rPr lang="en-US" sz="800" dirty="0" smtClean="0"/>
-              <a:t>1,3 c</a:t>
+              <a:t>03d</a:t>
             </a:r>
             <a:endParaRPr lang="en-US" sz="800" dirty="0"/>
           </a:p>
@@ -10316,14 +11950,168 @@
       </p:sp>
       <p:sp>
         <p:nvSpPr>
-          <p:cNvPr id="282" name="TextBox 281"/>
+          <p:cNvPr id="332" name="TextBox 331"/>
           <p:cNvSpPr txBox="1"/>
           <p:nvPr/>
         </p:nvSpPr>
         <p:spPr>
           <a:xfrm>
-            <a:off x="4114800" y="2286000"/>
-            <a:ext cx="381000" cy="338554"/>
+            <a:off x="7391400" y="2514600"/>
+            <a:ext cx="330540" cy="215444"/>
+          </a:xfrm>
+          <a:prstGeom prst="rect">
+            <a:avLst/>
+          </a:prstGeom>
+          <a:noFill/>
+        </p:spPr>
+        <p:txBody>
+          <a:bodyPr wrap="none" rtlCol="0">
+            <a:spAutoFit/>
+          </a:bodyPr>
+          <a:lstStyle/>
+          <a:p>
+            <a:r>
+              <a:rPr lang="en-US" sz="800" dirty="0" smtClean="0"/>
+              <a:t>13c</a:t>
+            </a:r>
+            <a:endParaRPr lang="en-US" sz="800" dirty="0"/>
+          </a:p>
+        </p:txBody>
+      </p:sp>
+      <p:sp>
+        <p:nvSpPr>
+          <p:cNvPr id="333" name="TextBox 332"/>
+          <p:cNvSpPr txBox="1"/>
+          <p:nvPr/>
+        </p:nvSpPr>
+        <p:spPr>
+          <a:xfrm>
+            <a:off x="7772400" y="2514600"/>
+            <a:ext cx="341760" cy="215444"/>
+          </a:xfrm>
+          <a:prstGeom prst="rect">
+            <a:avLst/>
+          </a:prstGeom>
+          <a:noFill/>
+        </p:spPr>
+        <p:txBody>
+          <a:bodyPr wrap="none" rtlCol="0">
+            <a:spAutoFit/>
+          </a:bodyPr>
+          <a:lstStyle/>
+          <a:p>
+            <a:r>
+              <a:rPr lang="en-US" sz="800" dirty="0" smtClean="0"/>
+              <a:t>0</a:t>
+            </a:r>
+            <a:r>
+              <a:rPr lang="en-US" sz="800" dirty="0" smtClean="0"/>
+              <a:t>0d</a:t>
+            </a:r>
+            <a:endParaRPr lang="en-US" sz="800" dirty="0"/>
+          </a:p>
+        </p:txBody>
+      </p:sp>
+      <p:sp>
+        <p:nvSpPr>
+          <p:cNvPr id="334" name="TextBox 333"/>
+          <p:cNvSpPr txBox="1"/>
+          <p:nvPr/>
+        </p:nvSpPr>
+        <p:spPr>
+          <a:xfrm>
+            <a:off x="7010400" y="2895600"/>
+            <a:ext cx="341760" cy="215444"/>
+          </a:xfrm>
+          <a:prstGeom prst="rect">
+            <a:avLst/>
+          </a:prstGeom>
+          <a:noFill/>
+        </p:spPr>
+        <p:txBody>
+          <a:bodyPr wrap="none" rtlCol="0">
+            <a:spAutoFit/>
+          </a:bodyPr>
+          <a:lstStyle/>
+          <a:p>
+            <a:r>
+              <a:rPr lang="en-US" sz="800" dirty="0" smtClean="0"/>
+              <a:t>02b</a:t>
+            </a:r>
+            <a:endParaRPr lang="en-US" sz="800" dirty="0"/>
+          </a:p>
+        </p:txBody>
+      </p:sp>
+      <p:sp>
+        <p:nvSpPr>
+          <p:cNvPr id="335" name="TextBox 334"/>
+          <p:cNvSpPr txBox="1"/>
+          <p:nvPr/>
+        </p:nvSpPr>
+        <p:spPr>
+          <a:xfrm>
+            <a:off x="7391400" y="2895600"/>
+            <a:ext cx="336952" cy="215444"/>
+          </a:xfrm>
+          <a:prstGeom prst="rect">
+            <a:avLst/>
+          </a:prstGeom>
+          <a:noFill/>
+        </p:spPr>
+        <p:txBody>
+          <a:bodyPr wrap="none" rtlCol="0">
+            <a:spAutoFit/>
+          </a:bodyPr>
+          <a:lstStyle/>
+          <a:p>
+            <a:r>
+              <a:rPr lang="en-US" sz="800" dirty="0" smtClean="0"/>
+              <a:t>22a</a:t>
+            </a:r>
+            <a:endParaRPr lang="en-US" sz="800" dirty="0"/>
+          </a:p>
+        </p:txBody>
+      </p:sp>
+      <p:cxnSp>
+        <p:nvCxnSpPr>
+          <p:cNvPr id="336" name="Straight Connector 335"/>
+          <p:cNvCxnSpPr/>
+          <p:nvPr/>
+        </p:nvCxnSpPr>
+        <p:spPr>
+          <a:xfrm>
+            <a:off x="4495800" y="1752600"/>
+            <a:ext cx="609600" cy="1588"/>
+          </a:xfrm>
+          <a:prstGeom prst="line">
+            <a:avLst/>
+          </a:prstGeom>
+        </p:spPr>
+        <p:style>
+          <a:lnRef idx="1">
+            <a:schemeClr val="accent1"/>
+          </a:lnRef>
+          <a:fillRef idx="0">
+            <a:schemeClr val="accent1"/>
+          </a:fillRef>
+          <a:effectRef idx="0">
+            <a:schemeClr val="accent1"/>
+          </a:effectRef>
+          <a:fontRef idx="minor">
+            <a:schemeClr val="tx1"/>
+          </a:fontRef>
+        </p:style>
+      </p:cxnSp>
+      <p:sp>
+        <p:nvSpPr>
+          <p:cNvPr id="337" name="TextBox 336"/>
+          <p:cNvSpPr txBox="1"/>
+          <p:nvPr/>
+        </p:nvSpPr>
+        <p:spPr>
+          <a:xfrm>
+            <a:off x="4800600" y="1752600"/>
+            <a:ext cx="381000" cy="215444"/>
           </a:xfrm>
           <a:prstGeom prst="rect">
             <a:avLst/>
@@ -10338,13 +12126,7 @@
           <a:p>
             <a:r>
               <a:rPr lang="en-US" sz="800" dirty="0" smtClean="0"/>
-              <a:t>0,4 </a:t>
-            </a:r>
-          </a:p>
-          <a:p>
-            <a:r>
-              <a:rPr lang="en-US" sz="800" dirty="0" err="1" smtClean="0"/>
-              <a:t>bd</a:t>
+              <a:t>00d</a:t>
             </a:r>
             <a:endParaRPr lang="en-US" sz="800" dirty="0"/>
           </a:p>
@@ -10352,14 +12134,14 @@
       </p:sp>
       <p:sp>
         <p:nvSpPr>
-          <p:cNvPr id="283" name="TextBox 282"/>
+          <p:cNvPr id="338" name="TextBox 337"/>
           <p:cNvSpPr txBox="1"/>
           <p:nvPr/>
         </p:nvSpPr>
         <p:spPr>
           <a:xfrm>
-            <a:off x="3790950" y="2286000"/>
-            <a:ext cx="381000" cy="338554"/>
+            <a:off x="4495800" y="1447800"/>
+            <a:ext cx="381000" cy="215444"/>
           </a:xfrm>
           <a:prstGeom prst="rect">
             <a:avLst/>
@@ -10374,28 +12156,52 @@
           <a:p>
             <a:r>
               <a:rPr lang="en-US" sz="800" dirty="0" smtClean="0"/>
-              <a:t>0,1 </a:t>
-            </a:r>
-          </a:p>
-          <a:p>
-            <a:r>
-              <a:rPr lang="en-US" sz="800" dirty="0" smtClean="0"/>
-              <a:t>ac</a:t>
+              <a:t>22a</a:t>
             </a:r>
             <a:endParaRPr lang="en-US" sz="800" dirty="0"/>
           </a:p>
         </p:txBody>
       </p:sp>
-      <p:sp>
-        <p:nvSpPr>
-          <p:cNvPr id="284" name="TextBox 283"/>
+      <p:cxnSp>
+        <p:nvCxnSpPr>
+          <p:cNvPr id="339" name="Straight Connector 338"/>
+          <p:cNvCxnSpPr/>
+          <p:nvPr/>
+        </p:nvCxnSpPr>
+        <p:spPr>
+          <a:xfrm>
+            <a:off x="8153400" y="990600"/>
+            <a:ext cx="304800" cy="1588"/>
+          </a:xfrm>
+          <a:prstGeom prst="line">
+            <a:avLst/>
+          </a:prstGeom>
+        </p:spPr>
+        <p:style>
+          <a:lnRef idx="1">
+            <a:schemeClr val="accent1"/>
+          </a:lnRef>
+          <a:fillRef idx="0">
+            <a:schemeClr val="accent1"/>
+          </a:fillRef>
+          <a:effectRef idx="0">
+            <a:schemeClr val="accent1"/>
+          </a:effectRef>
+          <a:fontRef idx="minor">
+            <a:schemeClr val="tx1"/>
+          </a:fontRef>
+        </p:style>
+      </p:cxnSp>
+      <p:sp>
+        <p:nvSpPr>
+          <p:cNvPr id="340" name="TextBox 339"/>
           <p:cNvSpPr txBox="1"/>
           <p:nvPr/>
         </p:nvSpPr>
         <p:spPr>
           <a:xfrm>
-            <a:off x="4495800" y="2286000"/>
-            <a:ext cx="381000" cy="338554"/>
+            <a:off x="8077200" y="1066800"/>
+            <a:ext cx="381000" cy="215444"/>
           </a:xfrm>
           <a:prstGeom prst="rect">
             <a:avLst/>
@@ -10410,28 +12216,52 @@
           <a:p>
             <a:r>
               <a:rPr lang="en-US" sz="800" dirty="0" smtClean="0"/>
-              <a:t>0,1 </a:t>
-            </a:r>
-          </a:p>
-          <a:p>
-            <a:r>
-              <a:rPr lang="en-US" sz="800" dirty="0" smtClean="0"/>
-              <a:t>ac</a:t>
+              <a:t>20c</a:t>
             </a:r>
             <a:endParaRPr lang="en-US" sz="800" dirty="0"/>
           </a:p>
         </p:txBody>
       </p:sp>
-      <p:sp>
-        <p:nvSpPr>
-          <p:cNvPr id="285" name="TextBox 284"/>
+      <p:cxnSp>
+        <p:nvCxnSpPr>
+          <p:cNvPr id="341" name="Straight Connector 340"/>
+          <p:cNvCxnSpPr/>
+          <p:nvPr/>
+        </p:nvCxnSpPr>
+        <p:spPr>
+          <a:xfrm>
+            <a:off x="5562600" y="1752600"/>
+            <a:ext cx="304800" cy="1588"/>
+          </a:xfrm>
+          <a:prstGeom prst="line">
+            <a:avLst/>
+          </a:prstGeom>
+        </p:spPr>
+        <p:style>
+          <a:lnRef idx="1">
+            <a:schemeClr val="accent1"/>
+          </a:lnRef>
+          <a:fillRef idx="0">
+            <a:schemeClr val="accent1"/>
+          </a:fillRef>
+          <a:effectRef idx="0">
+            <a:schemeClr val="accent1"/>
+          </a:effectRef>
+          <a:fontRef idx="minor">
+            <a:schemeClr val="tx1"/>
+          </a:fontRef>
+        </p:style>
+      </p:cxnSp>
+      <p:sp>
+        <p:nvSpPr>
+          <p:cNvPr id="342" name="TextBox 341"/>
           <p:cNvSpPr txBox="1"/>
           <p:nvPr/>
         </p:nvSpPr>
         <p:spPr>
           <a:xfrm>
-            <a:off x="5181600" y="2286000"/>
-            <a:ext cx="381000" cy="338554"/>
+            <a:off x="5562600" y="1752600"/>
+            <a:ext cx="381000" cy="215444"/>
           </a:xfrm>
           <a:prstGeom prst="rect">
             <a:avLst/>
@@ -10446,13 +12276,7 @@
           <a:p>
             <a:r>
               <a:rPr lang="en-US" sz="800" dirty="0" smtClean="0"/>
-              <a:t>0,1 </a:t>
-            </a:r>
-          </a:p>
-          <a:p>
-            <a:r>
-              <a:rPr lang="en-US" sz="800" dirty="0" smtClean="0"/>
-              <a:t>ac</a:t>
+              <a:t>00d</a:t>
             </a:r>
             <a:endParaRPr lang="en-US" sz="800" dirty="0"/>
           </a:p>
@@ -10460,14 +12284,14 @@
       </p:sp>
       <p:sp>
         <p:nvSpPr>
-          <p:cNvPr id="286" name="TextBox 285"/>
+          <p:cNvPr id="343" name="TextBox 342"/>
           <p:cNvSpPr txBox="1"/>
           <p:nvPr/>
         </p:nvSpPr>
         <p:spPr>
           <a:xfrm>
-            <a:off x="4102100" y="3048000"/>
-            <a:ext cx="381000" cy="338554"/>
+            <a:off x="6934200" y="1828800"/>
+            <a:ext cx="381000" cy="215444"/>
           </a:xfrm>
           <a:prstGeom prst="rect">
             <a:avLst/>
@@ -10482,172 +12306,52 @@
           <a:p>
             <a:r>
               <a:rPr lang="en-US" sz="800" dirty="0" smtClean="0"/>
-              <a:t>2,1 </a:t>
-            </a:r>
-          </a:p>
-          <a:p>
-            <a:r>
-              <a:rPr lang="en-US" sz="800" dirty="0" err="1" smtClean="0"/>
-              <a:t>bd</a:t>
+              <a:t>03d</a:t>
             </a:r>
             <a:endParaRPr lang="en-US" sz="800" dirty="0"/>
           </a:p>
         </p:txBody>
       </p:sp>
-      <p:sp>
-        <p:nvSpPr>
-          <p:cNvPr id="287" name="TextBox 286"/>
+      <p:cxnSp>
+        <p:nvCxnSpPr>
+          <p:cNvPr id="344" name="Straight Connector 343"/>
+          <p:cNvCxnSpPr/>
+          <p:nvPr/>
+        </p:nvCxnSpPr>
+        <p:spPr>
+          <a:xfrm>
+            <a:off x="7010400" y="1752600"/>
+            <a:ext cx="304800" cy="1588"/>
+          </a:xfrm>
+          <a:prstGeom prst="line">
+            <a:avLst/>
+          </a:prstGeom>
+        </p:spPr>
+        <p:style>
+          <a:lnRef idx="1">
+            <a:schemeClr val="accent1"/>
+          </a:lnRef>
+          <a:fillRef idx="0">
+            <a:schemeClr val="accent1"/>
+          </a:fillRef>
+          <a:effectRef idx="0">
+            <a:schemeClr val="accent1"/>
+          </a:effectRef>
+          <a:fontRef idx="minor">
+            <a:schemeClr val="tx1"/>
+          </a:fontRef>
+        </p:style>
+      </p:cxnSp>
+      <p:sp>
+        <p:nvSpPr>
+          <p:cNvPr id="345" name="TextBox 344"/>
           <p:cNvSpPr txBox="1"/>
           <p:nvPr/>
         </p:nvSpPr>
         <p:spPr>
           <a:xfrm>
-            <a:off x="4800600" y="3048000"/>
-            <a:ext cx="381000" cy="338554"/>
-          </a:xfrm>
-          <a:prstGeom prst="rect">
-            <a:avLst/>
-          </a:prstGeom>
-          <a:noFill/>
-        </p:spPr>
-        <p:txBody>
-          <a:bodyPr wrap="square" rtlCol="0">
-            <a:spAutoFit/>
-          </a:bodyPr>
-          <a:lstStyle/>
-          <a:p>
-            <a:r>
-              <a:rPr lang="en-US" sz="800" dirty="0" smtClean="0"/>
-              <a:t>2,1 </a:t>
-            </a:r>
-          </a:p>
-          <a:p>
-            <a:r>
-              <a:rPr lang="en-US" sz="800" dirty="0" err="1" smtClean="0"/>
-              <a:t>bd</a:t>
-            </a:r>
-            <a:endParaRPr lang="en-US" sz="800" dirty="0"/>
-          </a:p>
-        </p:txBody>
-      </p:sp>
-      <p:sp>
-        <p:nvSpPr>
-          <p:cNvPr id="288" name="TextBox 287"/>
-          <p:cNvSpPr txBox="1"/>
-          <p:nvPr/>
-        </p:nvSpPr>
-        <p:spPr>
-          <a:xfrm>
-            <a:off x="5562600" y="3048000"/>
-            <a:ext cx="381000" cy="338554"/>
-          </a:xfrm>
-          <a:prstGeom prst="rect">
-            <a:avLst/>
-          </a:prstGeom>
-          <a:noFill/>
-        </p:spPr>
-        <p:txBody>
-          <a:bodyPr wrap="square" rtlCol="0">
-            <a:spAutoFit/>
-          </a:bodyPr>
-          <a:lstStyle/>
-          <a:p>
-            <a:r>
-              <a:rPr lang="en-US" sz="800" dirty="0" smtClean="0"/>
-              <a:t>2,1 </a:t>
-            </a:r>
-          </a:p>
-          <a:p>
-            <a:r>
-              <a:rPr lang="en-US" sz="800" dirty="0" err="1" smtClean="0"/>
-              <a:t>bd</a:t>
-            </a:r>
-            <a:endParaRPr lang="en-US" sz="800" dirty="0"/>
-          </a:p>
-        </p:txBody>
-      </p:sp>
-      <p:sp>
-        <p:nvSpPr>
-          <p:cNvPr id="289" name="TextBox 288"/>
-          <p:cNvSpPr txBox="1"/>
-          <p:nvPr/>
-        </p:nvSpPr>
-        <p:spPr>
-          <a:xfrm>
-            <a:off x="3352800" y="3733800"/>
-            <a:ext cx="381000" cy="338554"/>
-          </a:xfrm>
-          <a:prstGeom prst="rect">
-            <a:avLst/>
-          </a:prstGeom>
-          <a:noFill/>
-        </p:spPr>
-        <p:txBody>
-          <a:bodyPr wrap="square" rtlCol="0">
-            <a:spAutoFit/>
-          </a:bodyPr>
-          <a:lstStyle/>
-          <a:p>
-            <a:r>
-              <a:rPr lang="en-US" sz="800" dirty="0" smtClean="0"/>
-              <a:t>2,1 </a:t>
-            </a:r>
-          </a:p>
-          <a:p>
-            <a:r>
-              <a:rPr lang="en-US" sz="800" dirty="0" err="1" smtClean="0"/>
-              <a:t>bd</a:t>
-            </a:r>
-            <a:endParaRPr lang="en-US" sz="800" dirty="0"/>
-          </a:p>
-        </p:txBody>
-      </p:sp>
-      <p:sp>
-        <p:nvSpPr>
-          <p:cNvPr id="290" name="TextBox 289"/>
-          <p:cNvSpPr txBox="1"/>
-          <p:nvPr/>
-        </p:nvSpPr>
-        <p:spPr>
-          <a:xfrm>
-            <a:off x="3048000" y="3733800"/>
-            <a:ext cx="381000" cy="338554"/>
-          </a:xfrm>
-          <a:prstGeom prst="rect">
-            <a:avLst/>
-          </a:prstGeom>
-          <a:noFill/>
-        </p:spPr>
-        <p:txBody>
-          <a:bodyPr wrap="square" rtlCol="0">
-            <a:spAutoFit/>
-          </a:bodyPr>
-          <a:lstStyle/>
-          <a:p>
-            <a:r>
-              <a:rPr lang="en-US" sz="800" dirty="0" smtClean="0"/>
-              <a:t>0,1 </a:t>
-            </a:r>
-          </a:p>
-          <a:p>
-            <a:r>
-              <a:rPr lang="en-US" sz="800" dirty="0" smtClean="0"/>
-              <a:t>ac</a:t>
-            </a:r>
-            <a:endParaRPr lang="en-US" sz="800" dirty="0"/>
-          </a:p>
-        </p:txBody>
-      </p:sp>
-      <p:sp>
-        <p:nvSpPr>
-          <p:cNvPr id="291" name="TextBox 290"/>
-          <p:cNvSpPr txBox="1"/>
-          <p:nvPr/>
-        </p:nvSpPr>
-        <p:spPr>
-          <a:xfrm>
-            <a:off x="3886200" y="3657600"/>
-            <a:ext cx="439544" cy="215444"/>
+            <a:off x="7391400" y="1447800"/>
+            <a:ext cx="336952" cy="215444"/>
           </a:xfrm>
           <a:prstGeom prst="rect">
             <a:avLst/>
@@ -10662,866 +12366,72 @@
           <a:p>
             <a:r>
               <a:rPr lang="en-US" sz="800" dirty="0" smtClean="0"/>
-              <a:t>1,0 </a:t>
-            </a:r>
-            <a:r>
-              <a:rPr lang="en-US" sz="800" dirty="0" err="1" smtClean="0"/>
-              <a:t>ab</a:t>
+              <a:t>22a</a:t>
             </a:r>
             <a:endParaRPr lang="en-US" sz="800" dirty="0"/>
           </a:p>
         </p:txBody>
       </p:sp>
-      <p:sp>
-        <p:nvSpPr>
-          <p:cNvPr id="292" name="TextBox 291"/>
-          <p:cNvSpPr txBox="1"/>
-          <p:nvPr/>
-        </p:nvSpPr>
-        <p:spPr>
-          <a:xfrm>
-            <a:off x="3886200" y="3962400"/>
-            <a:ext cx="433132" cy="215444"/>
-          </a:xfrm>
-          <a:prstGeom prst="rect">
-            <a:avLst/>
-          </a:prstGeom>
-          <a:noFill/>
-        </p:spPr>
-        <p:txBody>
-          <a:bodyPr wrap="none" rtlCol="0">
-            <a:spAutoFit/>
-          </a:bodyPr>
-          <a:lstStyle/>
-          <a:p>
-            <a:r>
-              <a:rPr lang="en-US" sz="800" dirty="0" smtClean="0"/>
-              <a:t>1,2 </a:t>
-            </a:r>
-            <a:r>
-              <a:rPr lang="en-US" sz="800" dirty="0" err="1" smtClean="0"/>
-              <a:t>cd</a:t>
-            </a:r>
-            <a:endParaRPr lang="en-US" sz="800" dirty="0"/>
-          </a:p>
-        </p:txBody>
-      </p:sp>
-      <p:sp>
-        <p:nvSpPr>
-          <p:cNvPr id="293" name="TextBox 292"/>
-          <p:cNvSpPr txBox="1"/>
-          <p:nvPr/>
-        </p:nvSpPr>
-        <p:spPr>
-          <a:xfrm>
-            <a:off x="5257800" y="3657600"/>
-            <a:ext cx="482824" cy="215444"/>
-          </a:xfrm>
-          <a:prstGeom prst="rect">
-            <a:avLst/>
-          </a:prstGeom>
-          <a:noFill/>
-        </p:spPr>
-        <p:txBody>
-          <a:bodyPr wrap="none" rtlCol="0">
-            <a:spAutoFit/>
-          </a:bodyPr>
-          <a:lstStyle/>
-          <a:p>
-            <a:r>
-              <a:rPr lang="en-US" sz="800" dirty="0" smtClean="0"/>
-              <a:t>0,0 </a:t>
-            </a:r>
-            <a:r>
-              <a:rPr lang="en-US" sz="800" dirty="0" err="1" smtClean="0"/>
-              <a:t>abc</a:t>
-            </a:r>
-            <a:endParaRPr lang="en-US" sz="800" dirty="0"/>
-          </a:p>
-        </p:txBody>
-      </p:sp>
-      <p:sp>
-        <p:nvSpPr>
-          <p:cNvPr id="294" name="TextBox 293"/>
-          <p:cNvSpPr txBox="1"/>
-          <p:nvPr/>
-        </p:nvSpPr>
-        <p:spPr>
-          <a:xfrm>
-            <a:off x="5530850" y="3981450"/>
-            <a:ext cx="389850" cy="215444"/>
-          </a:xfrm>
-          <a:prstGeom prst="rect">
-            <a:avLst/>
-          </a:prstGeom>
-          <a:noFill/>
-        </p:spPr>
-        <p:txBody>
-          <a:bodyPr wrap="none" rtlCol="0">
-            <a:spAutoFit/>
-          </a:bodyPr>
-          <a:lstStyle/>
-          <a:p>
-            <a:r>
-              <a:rPr lang="en-US" sz="800" dirty="0" smtClean="0"/>
-              <a:t>0,3 d</a:t>
-            </a:r>
-            <a:endParaRPr lang="en-US" sz="800" dirty="0"/>
-          </a:p>
-        </p:txBody>
-      </p:sp>
-      <p:sp>
-        <p:nvSpPr>
-          <p:cNvPr id="295" name="TextBox 294"/>
-          <p:cNvSpPr txBox="1"/>
-          <p:nvPr/>
-        </p:nvSpPr>
-        <p:spPr>
-          <a:xfrm>
-            <a:off x="5334000" y="4419600"/>
-            <a:ext cx="439544" cy="215444"/>
-          </a:xfrm>
-          <a:prstGeom prst="rect">
-            <a:avLst/>
-          </a:prstGeom>
-          <a:noFill/>
-        </p:spPr>
-        <p:txBody>
-          <a:bodyPr wrap="none" rtlCol="0">
-            <a:spAutoFit/>
-          </a:bodyPr>
-          <a:lstStyle/>
-          <a:p>
-            <a:r>
-              <a:rPr lang="en-US" sz="800" dirty="0" smtClean="0"/>
-              <a:t>0,0 </a:t>
-            </a:r>
-            <a:r>
-              <a:rPr lang="en-US" sz="800" dirty="0" err="1" smtClean="0"/>
-              <a:t>ab</a:t>
-            </a:r>
-            <a:endParaRPr lang="en-US" sz="800" dirty="0"/>
-          </a:p>
-        </p:txBody>
-      </p:sp>
-      <p:sp>
-        <p:nvSpPr>
-          <p:cNvPr id="296" name="TextBox 295"/>
-          <p:cNvSpPr txBox="1"/>
-          <p:nvPr/>
-        </p:nvSpPr>
-        <p:spPr>
-          <a:xfrm>
-            <a:off x="5257800" y="4648200"/>
-            <a:ext cx="433132" cy="215444"/>
-          </a:xfrm>
-          <a:prstGeom prst="rect">
-            <a:avLst/>
-          </a:prstGeom>
-          <a:noFill/>
-        </p:spPr>
-        <p:txBody>
-          <a:bodyPr wrap="none" rtlCol="0">
-            <a:spAutoFit/>
-          </a:bodyPr>
-          <a:lstStyle/>
-          <a:p>
-            <a:r>
-              <a:rPr lang="en-US" sz="800" dirty="0" smtClean="0"/>
-              <a:t>0,2 </a:t>
-            </a:r>
-            <a:r>
-              <a:rPr lang="en-US" sz="800" dirty="0" err="1" smtClean="0"/>
-              <a:t>cd</a:t>
-            </a:r>
-            <a:endParaRPr lang="en-US" sz="800" dirty="0"/>
-          </a:p>
-        </p:txBody>
-      </p:sp>
-      <p:sp>
-        <p:nvSpPr>
-          <p:cNvPr id="297" name="TextBox 296"/>
-          <p:cNvSpPr txBox="1"/>
-          <p:nvPr/>
-        </p:nvSpPr>
-        <p:spPr>
-          <a:xfrm>
-            <a:off x="5543550" y="2533650"/>
-            <a:ext cx="389850" cy="215444"/>
-          </a:xfrm>
-          <a:prstGeom prst="rect">
-            <a:avLst/>
-          </a:prstGeom>
-          <a:noFill/>
-        </p:spPr>
-        <p:txBody>
-          <a:bodyPr wrap="none" rtlCol="0">
-            <a:spAutoFit/>
-          </a:bodyPr>
-          <a:lstStyle/>
-          <a:p>
-            <a:r>
-              <a:rPr lang="en-US" sz="800" dirty="0" smtClean="0"/>
-              <a:t>0,3 d</a:t>
-            </a:r>
-            <a:endParaRPr lang="en-US" sz="800" dirty="0"/>
-          </a:p>
-        </p:txBody>
-      </p:sp>
-      <p:sp>
-        <p:nvSpPr>
-          <p:cNvPr id="298" name="TextBox 297"/>
-          <p:cNvSpPr txBox="1"/>
-          <p:nvPr/>
-        </p:nvSpPr>
-        <p:spPr>
-          <a:xfrm>
-            <a:off x="5543550" y="2152650"/>
-            <a:ext cx="389850" cy="215444"/>
-          </a:xfrm>
-          <a:prstGeom prst="rect">
-            <a:avLst/>
-          </a:prstGeom>
-          <a:noFill/>
-        </p:spPr>
-        <p:txBody>
-          <a:bodyPr wrap="none" rtlCol="0">
-            <a:spAutoFit/>
-          </a:bodyPr>
-          <a:lstStyle/>
-          <a:p>
-            <a:r>
-              <a:rPr lang="en-US" sz="800" dirty="0" smtClean="0"/>
-              <a:t>0,4 b</a:t>
-            </a:r>
-            <a:endParaRPr lang="en-US" sz="800" dirty="0"/>
-          </a:p>
-        </p:txBody>
-      </p:sp>
-      <p:sp>
-        <p:nvSpPr>
-          <p:cNvPr id="299" name="TextBox 298"/>
-          <p:cNvSpPr txBox="1"/>
-          <p:nvPr/>
-        </p:nvSpPr>
-        <p:spPr>
-          <a:xfrm>
-            <a:off x="4775200" y="2286000"/>
-            <a:ext cx="381000" cy="338554"/>
-          </a:xfrm>
-          <a:prstGeom prst="rect">
-            <a:avLst/>
-          </a:prstGeom>
-          <a:noFill/>
-        </p:spPr>
-        <p:txBody>
-          <a:bodyPr wrap="square" rtlCol="0">
-            <a:spAutoFit/>
-          </a:bodyPr>
-          <a:lstStyle/>
-          <a:p>
-            <a:r>
-              <a:rPr lang="en-US" sz="800" dirty="0" smtClean="0"/>
-              <a:t>0,3 </a:t>
-            </a:r>
-          </a:p>
-          <a:p>
-            <a:r>
-              <a:rPr lang="en-US" sz="800" dirty="0" err="1" smtClean="0"/>
-              <a:t>bd</a:t>
-            </a:r>
-            <a:endParaRPr lang="en-US" sz="800" dirty="0"/>
-          </a:p>
-        </p:txBody>
-      </p:sp>
-      <p:sp>
-        <p:nvSpPr>
-          <p:cNvPr id="300" name="TextBox 299"/>
-          <p:cNvSpPr txBox="1"/>
-          <p:nvPr/>
-        </p:nvSpPr>
-        <p:spPr>
-          <a:xfrm>
-            <a:off x="3778250" y="2997200"/>
-            <a:ext cx="381000" cy="338554"/>
-          </a:xfrm>
-          <a:prstGeom prst="rect">
-            <a:avLst/>
-          </a:prstGeom>
-          <a:noFill/>
-        </p:spPr>
-        <p:txBody>
-          <a:bodyPr wrap="square" rtlCol="0">
-            <a:spAutoFit/>
-          </a:bodyPr>
-          <a:lstStyle/>
-          <a:p>
-            <a:r>
-              <a:rPr lang="en-US" sz="800" dirty="0" smtClean="0"/>
-              <a:t>1,3 </a:t>
-            </a:r>
-          </a:p>
-          <a:p>
-            <a:r>
-              <a:rPr lang="en-US" sz="800" dirty="0" smtClean="0"/>
-              <a:t>ac</a:t>
-            </a:r>
-            <a:endParaRPr lang="en-US" sz="800" dirty="0"/>
-          </a:p>
-        </p:txBody>
-      </p:sp>
-      <p:sp>
-        <p:nvSpPr>
-          <p:cNvPr id="301" name="TextBox 300"/>
-          <p:cNvSpPr txBox="1"/>
-          <p:nvPr/>
-        </p:nvSpPr>
-        <p:spPr>
-          <a:xfrm>
-            <a:off x="4483100" y="3048000"/>
-            <a:ext cx="381000" cy="338554"/>
-          </a:xfrm>
-          <a:prstGeom prst="rect">
-            <a:avLst/>
-          </a:prstGeom>
-          <a:noFill/>
-        </p:spPr>
-        <p:txBody>
-          <a:bodyPr wrap="square" rtlCol="0">
-            <a:spAutoFit/>
-          </a:bodyPr>
-          <a:lstStyle/>
-          <a:p>
-            <a:r>
-              <a:rPr lang="en-US" sz="800" dirty="0" smtClean="0"/>
-              <a:t>1,4 </a:t>
-            </a:r>
-          </a:p>
-          <a:p>
-            <a:r>
-              <a:rPr lang="en-US" sz="800" dirty="0" smtClean="0"/>
-              <a:t>ac</a:t>
-            </a:r>
-            <a:endParaRPr lang="en-US" sz="800" dirty="0"/>
-          </a:p>
-        </p:txBody>
-      </p:sp>
-      <p:sp>
-        <p:nvSpPr>
-          <p:cNvPr id="302" name="TextBox 301"/>
-          <p:cNvSpPr txBox="1"/>
-          <p:nvPr/>
-        </p:nvSpPr>
-        <p:spPr>
-          <a:xfrm>
-            <a:off x="3810000" y="4724400"/>
-            <a:ext cx="482824" cy="215444"/>
-          </a:xfrm>
-          <a:prstGeom prst="rect">
-            <a:avLst/>
-          </a:prstGeom>
-          <a:noFill/>
-        </p:spPr>
-        <p:txBody>
-          <a:bodyPr wrap="none" rtlCol="0">
-            <a:spAutoFit/>
-          </a:bodyPr>
-          <a:lstStyle/>
-          <a:p>
-            <a:r>
-              <a:rPr lang="en-US" sz="800" dirty="0" smtClean="0"/>
-              <a:t>0,2 </a:t>
-            </a:r>
-            <a:r>
-              <a:rPr lang="en-US" sz="800" dirty="0" err="1" smtClean="0"/>
-              <a:t>acd</a:t>
-            </a:r>
-            <a:endParaRPr lang="en-US" sz="800" dirty="0"/>
-          </a:p>
-        </p:txBody>
-      </p:sp>
-      <p:sp>
-        <p:nvSpPr>
-          <p:cNvPr id="303" name="TextBox 302"/>
-          <p:cNvSpPr txBox="1"/>
-          <p:nvPr/>
-        </p:nvSpPr>
-        <p:spPr>
-          <a:xfrm>
-            <a:off x="4064000" y="4343400"/>
-            <a:ext cx="389850" cy="215444"/>
-          </a:xfrm>
-          <a:prstGeom prst="rect">
-            <a:avLst/>
-          </a:prstGeom>
-          <a:noFill/>
-        </p:spPr>
-        <p:txBody>
-          <a:bodyPr wrap="none" rtlCol="0">
-            <a:spAutoFit/>
-          </a:bodyPr>
-          <a:lstStyle/>
-          <a:p>
-            <a:r>
-              <a:rPr lang="en-US" sz="800" dirty="0" smtClean="0"/>
-              <a:t>0,4 b</a:t>
-            </a:r>
-            <a:endParaRPr lang="en-US" sz="800" dirty="0"/>
-          </a:p>
-        </p:txBody>
-      </p:sp>
-      <p:sp>
-        <p:nvSpPr>
-          <p:cNvPr id="304" name="TextBox 303"/>
-          <p:cNvSpPr txBox="1"/>
-          <p:nvPr/>
-        </p:nvSpPr>
-        <p:spPr>
-          <a:xfrm>
-            <a:off x="4495800" y="4495800"/>
-            <a:ext cx="335348" cy="338554"/>
-          </a:xfrm>
-          <a:prstGeom prst="rect">
-            <a:avLst/>
-          </a:prstGeom>
-          <a:noFill/>
-        </p:spPr>
-        <p:txBody>
-          <a:bodyPr wrap="none" rtlCol="0">
-            <a:spAutoFit/>
-          </a:bodyPr>
-          <a:lstStyle/>
-          <a:p>
-            <a:r>
-              <a:rPr lang="en-US" sz="800" dirty="0" smtClean="0"/>
-              <a:t>0,0 </a:t>
-            </a:r>
-          </a:p>
-          <a:p>
-            <a:r>
-              <a:rPr lang="en-US" sz="800" dirty="0" smtClean="0"/>
-              <a:t>ac</a:t>
-            </a:r>
-            <a:endParaRPr lang="en-US" sz="800" dirty="0"/>
-          </a:p>
-        </p:txBody>
-      </p:sp>
-      <p:sp>
-        <p:nvSpPr>
-          <p:cNvPr id="305" name="TextBox 304"/>
-          <p:cNvSpPr txBox="1"/>
-          <p:nvPr/>
-        </p:nvSpPr>
-        <p:spPr>
-          <a:xfrm>
-            <a:off x="4800600" y="4495800"/>
-            <a:ext cx="335348" cy="338554"/>
-          </a:xfrm>
-          <a:prstGeom prst="rect">
-            <a:avLst/>
-          </a:prstGeom>
-          <a:noFill/>
-        </p:spPr>
-        <p:txBody>
-          <a:bodyPr wrap="none" rtlCol="0">
-            <a:spAutoFit/>
-          </a:bodyPr>
-          <a:lstStyle/>
-          <a:p>
-            <a:r>
-              <a:rPr lang="en-US" sz="800" dirty="0" smtClean="0"/>
-              <a:t>2,0 </a:t>
-            </a:r>
-          </a:p>
-          <a:p>
-            <a:r>
-              <a:rPr lang="en-US" sz="800" dirty="0" err="1" smtClean="0"/>
-              <a:t>bd</a:t>
-            </a:r>
-            <a:endParaRPr lang="en-US" sz="800" dirty="0"/>
-          </a:p>
-        </p:txBody>
-      </p:sp>
-      <p:sp>
-        <p:nvSpPr>
-          <p:cNvPr id="306" name="TextBox 305"/>
-          <p:cNvSpPr txBox="1"/>
-          <p:nvPr/>
-        </p:nvSpPr>
-        <p:spPr>
-          <a:xfrm>
-            <a:off x="5943600" y="4572000"/>
-            <a:ext cx="335348" cy="338554"/>
-          </a:xfrm>
-          <a:prstGeom prst="rect">
-            <a:avLst/>
-          </a:prstGeom>
-          <a:noFill/>
-        </p:spPr>
-        <p:txBody>
-          <a:bodyPr wrap="none" rtlCol="0">
-            <a:spAutoFit/>
-          </a:bodyPr>
-          <a:lstStyle/>
-          <a:p>
-            <a:r>
-              <a:rPr lang="en-US" sz="800" dirty="0" smtClean="0"/>
-              <a:t>0,2 </a:t>
-            </a:r>
-          </a:p>
-          <a:p>
-            <a:r>
-              <a:rPr lang="en-US" sz="800" dirty="0" smtClean="0"/>
-              <a:t>ac</a:t>
-            </a:r>
-            <a:endParaRPr lang="en-US" sz="800" dirty="0"/>
-          </a:p>
-        </p:txBody>
-      </p:sp>
-      <p:sp>
-        <p:nvSpPr>
-          <p:cNvPr id="307" name="TextBox 306"/>
-          <p:cNvSpPr txBox="1"/>
-          <p:nvPr/>
-        </p:nvSpPr>
-        <p:spPr>
-          <a:xfrm>
-            <a:off x="6248400" y="4572000"/>
-            <a:ext cx="336952" cy="338554"/>
-          </a:xfrm>
-          <a:prstGeom prst="rect">
-            <a:avLst/>
-          </a:prstGeom>
-          <a:noFill/>
-        </p:spPr>
-        <p:txBody>
-          <a:bodyPr wrap="none" rtlCol="0">
-            <a:spAutoFit/>
-          </a:bodyPr>
-          <a:lstStyle/>
-          <a:p>
-            <a:r>
-              <a:rPr lang="en-US" sz="800" dirty="0" smtClean="0"/>
-              <a:t>2,2 </a:t>
-            </a:r>
-          </a:p>
-          <a:p>
-            <a:r>
-              <a:rPr lang="en-US" sz="800" dirty="0" err="1" smtClean="0"/>
-              <a:t>bd</a:t>
-            </a:r>
-            <a:endParaRPr lang="en-US" sz="800" dirty="0"/>
-          </a:p>
-        </p:txBody>
-      </p:sp>
-      <p:sp>
-        <p:nvSpPr>
-          <p:cNvPr id="308" name="TextBox 307"/>
-          <p:cNvSpPr txBox="1"/>
-          <p:nvPr/>
-        </p:nvSpPr>
-        <p:spPr>
-          <a:xfrm>
-            <a:off x="6781800" y="4419600"/>
-            <a:ext cx="439544" cy="215444"/>
-          </a:xfrm>
-          <a:prstGeom prst="rect">
-            <a:avLst/>
-          </a:prstGeom>
-          <a:noFill/>
-        </p:spPr>
-        <p:txBody>
-          <a:bodyPr wrap="none" rtlCol="0">
-            <a:spAutoFit/>
-          </a:bodyPr>
-          <a:lstStyle/>
-          <a:p>
-            <a:r>
-              <a:rPr lang="en-US" sz="800" dirty="0" smtClean="0"/>
-              <a:t>2,0 </a:t>
-            </a:r>
-            <a:r>
-              <a:rPr lang="en-US" sz="800" dirty="0" err="1" smtClean="0"/>
-              <a:t>ab</a:t>
-            </a:r>
-            <a:endParaRPr lang="en-US" sz="800" dirty="0"/>
-          </a:p>
-        </p:txBody>
-      </p:sp>
-      <p:sp>
-        <p:nvSpPr>
-          <p:cNvPr id="309" name="TextBox 308"/>
-          <p:cNvSpPr txBox="1"/>
-          <p:nvPr/>
-        </p:nvSpPr>
-        <p:spPr>
-          <a:xfrm>
-            <a:off x="6788150" y="4654550"/>
-            <a:ext cx="433132" cy="215444"/>
-          </a:xfrm>
-          <a:prstGeom prst="rect">
-            <a:avLst/>
-          </a:prstGeom>
-          <a:noFill/>
-        </p:spPr>
-        <p:txBody>
-          <a:bodyPr wrap="none" rtlCol="0">
-            <a:spAutoFit/>
-          </a:bodyPr>
-          <a:lstStyle/>
-          <a:p>
-            <a:r>
-              <a:rPr lang="en-US" sz="800" dirty="0" smtClean="0"/>
-              <a:t>2,2 </a:t>
-            </a:r>
-            <a:r>
-              <a:rPr lang="en-US" sz="800" dirty="0" err="1" smtClean="0"/>
-              <a:t>cd</a:t>
-            </a:r>
-            <a:endParaRPr lang="en-US" sz="800" dirty="0"/>
-          </a:p>
-        </p:txBody>
-      </p:sp>
-      <p:sp>
-        <p:nvSpPr>
-          <p:cNvPr id="310" name="TextBox 309"/>
-          <p:cNvSpPr txBox="1"/>
-          <p:nvPr/>
-        </p:nvSpPr>
-        <p:spPr>
-          <a:xfrm>
-            <a:off x="7391400" y="4343400"/>
-            <a:ext cx="385042" cy="215444"/>
-          </a:xfrm>
-          <a:prstGeom prst="rect">
-            <a:avLst/>
-          </a:prstGeom>
-          <a:noFill/>
-        </p:spPr>
-        <p:txBody>
-          <a:bodyPr wrap="none" rtlCol="0">
-            <a:spAutoFit/>
-          </a:bodyPr>
-          <a:lstStyle/>
-          <a:p>
-            <a:r>
-              <a:rPr lang="en-US" sz="800" dirty="0" smtClean="0"/>
-              <a:t>0,0 a</a:t>
-            </a:r>
-            <a:endParaRPr lang="en-US" sz="800" dirty="0"/>
-          </a:p>
-        </p:txBody>
-      </p:sp>
-      <p:sp>
-        <p:nvSpPr>
-          <p:cNvPr id="311" name="TextBox 310"/>
-          <p:cNvSpPr txBox="1"/>
-          <p:nvPr/>
-        </p:nvSpPr>
-        <p:spPr>
-          <a:xfrm>
-            <a:off x="7696200" y="4343400"/>
-            <a:ext cx="389850" cy="215444"/>
-          </a:xfrm>
-          <a:prstGeom prst="rect">
-            <a:avLst/>
-          </a:prstGeom>
-          <a:noFill/>
-        </p:spPr>
-        <p:txBody>
-          <a:bodyPr wrap="none" rtlCol="0">
-            <a:spAutoFit/>
-          </a:bodyPr>
-          <a:lstStyle/>
-          <a:p>
-            <a:r>
-              <a:rPr lang="en-US" sz="800" dirty="0" smtClean="0"/>
-              <a:t>2,0 b</a:t>
-            </a:r>
-            <a:endParaRPr lang="en-US" sz="800" dirty="0"/>
-          </a:p>
-        </p:txBody>
-      </p:sp>
-      <p:sp>
-        <p:nvSpPr>
-          <p:cNvPr id="312" name="TextBox 311"/>
-          <p:cNvSpPr txBox="1"/>
-          <p:nvPr/>
-        </p:nvSpPr>
-        <p:spPr>
-          <a:xfrm>
-            <a:off x="7391400" y="4724400"/>
-            <a:ext cx="378630" cy="215444"/>
-          </a:xfrm>
-          <a:prstGeom prst="rect">
-            <a:avLst/>
-          </a:prstGeom>
-          <a:noFill/>
-        </p:spPr>
-        <p:txBody>
-          <a:bodyPr wrap="none" rtlCol="0">
-            <a:spAutoFit/>
-          </a:bodyPr>
-          <a:lstStyle/>
-          <a:p>
-            <a:r>
-              <a:rPr lang="en-US" sz="800" dirty="0" smtClean="0"/>
-              <a:t>0,2 c</a:t>
-            </a:r>
-            <a:endParaRPr lang="en-US" sz="800" dirty="0"/>
-          </a:p>
-        </p:txBody>
-      </p:sp>
-      <p:sp>
-        <p:nvSpPr>
-          <p:cNvPr id="313" name="TextBox 312"/>
-          <p:cNvSpPr txBox="1"/>
-          <p:nvPr/>
-        </p:nvSpPr>
-        <p:spPr>
-          <a:xfrm>
-            <a:off x="7696200" y="4724400"/>
-            <a:ext cx="389850" cy="215444"/>
-          </a:xfrm>
-          <a:prstGeom prst="rect">
-            <a:avLst/>
-          </a:prstGeom>
-          <a:noFill/>
-        </p:spPr>
-        <p:txBody>
-          <a:bodyPr wrap="none" rtlCol="0">
-            <a:spAutoFit/>
-          </a:bodyPr>
-          <a:lstStyle/>
-          <a:p>
-            <a:r>
-              <a:rPr lang="en-US" sz="800" smtClean="0"/>
-              <a:t>2,2 d</a:t>
-            </a:r>
-            <a:endParaRPr lang="en-US" sz="800" dirty="0"/>
-          </a:p>
-        </p:txBody>
-      </p:sp>
-      <p:sp>
-        <p:nvSpPr>
-          <p:cNvPr id="2" name="TextBox 1"/>
-          <p:cNvSpPr txBox="1"/>
-          <p:nvPr/>
-        </p:nvSpPr>
-        <p:spPr>
-          <a:xfrm>
-            <a:off x="3076690" y="218331"/>
-            <a:ext cx="5564344" cy="369332"/>
-          </a:xfrm>
-          <a:prstGeom prst="rect">
-            <a:avLst/>
-          </a:prstGeom>
-          <a:noFill/>
-        </p:spPr>
-        <p:txBody>
-          <a:bodyPr wrap="none" rtlCol="0">
-            <a:spAutoFit/>
-          </a:bodyPr>
-          <a:lstStyle/>
-          <a:p>
-            <a:r>
-              <a:rPr lang="en-US" dirty="0" smtClean="0"/>
-              <a:t>0             1            2            3           4           5            6             7</a:t>
-            </a:r>
-            <a:endParaRPr lang="sk-SK" dirty="0"/>
-          </a:p>
-        </p:txBody>
-      </p:sp>
-      <p:sp>
-        <p:nvSpPr>
-          <p:cNvPr id="3" name="TextBox 2"/>
-          <p:cNvSpPr txBox="1"/>
-          <p:nvPr/>
-        </p:nvSpPr>
-        <p:spPr>
-          <a:xfrm>
-            <a:off x="2716200" y="387643"/>
-            <a:ext cx="274320" cy="4579715"/>
-          </a:xfrm>
-          <a:prstGeom prst="rect">
-            <a:avLst/>
-          </a:prstGeom>
-          <a:noFill/>
-        </p:spPr>
-        <p:txBody>
-          <a:bodyPr wrap="square" rtlCol="0">
-            <a:spAutoFit/>
-          </a:bodyPr>
-          <a:lstStyle/>
-          <a:p>
-            <a:pPr>
-              <a:lnSpc>
-                <a:spcPct val="270000"/>
-              </a:lnSpc>
-            </a:pPr>
-            <a:r>
-              <a:rPr lang="en-US" dirty="0" smtClean="0"/>
-              <a:t>0</a:t>
-            </a:r>
-          </a:p>
-          <a:p>
-            <a:pPr>
-              <a:lnSpc>
-                <a:spcPct val="270000"/>
-              </a:lnSpc>
-            </a:pPr>
-            <a:r>
-              <a:rPr lang="en-US" dirty="0" smtClean="0"/>
-              <a:t>1</a:t>
-            </a:r>
-          </a:p>
-          <a:p>
-            <a:pPr>
-              <a:lnSpc>
-                <a:spcPct val="270000"/>
-              </a:lnSpc>
-            </a:pPr>
-            <a:r>
-              <a:rPr lang="en-US" dirty="0" smtClean="0"/>
-              <a:t>2</a:t>
-            </a:r>
-          </a:p>
-          <a:p>
-            <a:pPr>
-              <a:lnSpc>
-                <a:spcPct val="270000"/>
-              </a:lnSpc>
-            </a:pPr>
-            <a:r>
-              <a:rPr lang="en-US" dirty="0" smtClean="0"/>
-              <a:t>3</a:t>
-            </a:r>
-          </a:p>
-          <a:p>
-            <a:pPr>
-              <a:lnSpc>
-                <a:spcPct val="270000"/>
-              </a:lnSpc>
-            </a:pPr>
-            <a:r>
-              <a:rPr lang="en-US" dirty="0" smtClean="0"/>
-              <a:t>4</a:t>
-            </a:r>
-          </a:p>
-          <a:p>
-            <a:pPr>
-              <a:lnSpc>
-                <a:spcPct val="270000"/>
-              </a:lnSpc>
-            </a:pPr>
-            <a:r>
-              <a:rPr lang="en-US" dirty="0" smtClean="0"/>
-              <a:t>5</a:t>
-            </a:r>
-            <a:endParaRPr lang="sk-SK" dirty="0"/>
-          </a:p>
-        </p:txBody>
-      </p:sp>
+      <p:cxnSp>
+        <p:nvCxnSpPr>
+          <p:cNvPr id="347" name="Straight Connector 346"/>
+          <p:cNvCxnSpPr/>
+          <p:nvPr/>
+        </p:nvCxnSpPr>
+        <p:spPr>
+          <a:xfrm rot="5400000">
+            <a:off x="6858000" y="3048000"/>
+            <a:ext cx="304800" cy="1588"/>
+          </a:xfrm>
+          <a:prstGeom prst="line">
+            <a:avLst/>
+          </a:prstGeom>
+        </p:spPr>
+        <p:style>
+          <a:lnRef idx="1">
+            <a:schemeClr val="accent1"/>
+          </a:lnRef>
+          <a:fillRef idx="0">
+            <a:schemeClr val="accent1"/>
+          </a:fillRef>
+          <a:effectRef idx="0">
+            <a:schemeClr val="accent1"/>
+          </a:effectRef>
+          <a:fontRef idx="minor">
+            <a:schemeClr val="tx1"/>
+          </a:fontRef>
+        </p:style>
+      </p:cxnSp>
+      <p:cxnSp>
+        <p:nvCxnSpPr>
+          <p:cNvPr id="349" name="Straight Connector 348"/>
+          <p:cNvCxnSpPr/>
+          <p:nvPr/>
+        </p:nvCxnSpPr>
+        <p:spPr>
+          <a:xfrm rot="5400000">
+            <a:off x="7543800" y="3048000"/>
+            <a:ext cx="304800" cy="1588"/>
+          </a:xfrm>
+          <a:prstGeom prst="line">
+            <a:avLst/>
+          </a:prstGeom>
+        </p:spPr>
+        <p:style>
+          <a:lnRef idx="1">
+            <a:schemeClr val="accent1"/>
+          </a:lnRef>
+          <a:fillRef idx="0">
+            <a:schemeClr val="accent1"/>
+          </a:fillRef>
+          <a:effectRef idx="0">
+            <a:schemeClr val="accent1"/>
+          </a:effectRef>
+          <a:fontRef idx="minor">
+            <a:schemeClr val="tx1"/>
+          </a:fontRef>
+        </p:style>
+      </p:cxnSp>
     </p:spTree>
   </p:cSld>
   <p:clrMapOvr>

</xml_diff>